<commit_message>
backlog e backlog ppt
</commit_message>
<xml_diff>
--- a/Documentação/Pyxis.pptx
+++ b/Documentação/Pyxis.pptx
@@ -7250,8 +7250,8 @@
         </p:nvGrpSpPr>
         <p:grpSpPr>
           <a:xfrm>
-            <a:off x="4915660" y="2171626"/>
-            <a:ext cx="5336375" cy="7458075"/>
+            <a:off x="4383496" y="2171626"/>
+            <a:ext cx="5868540" cy="7458075"/>
             <a:chOff x="0" y="0"/>
             <a:chExt cx="1805144" cy="2522855"/>
           </a:xfrm>
@@ -7453,15 +7453,15 @@
         </p:nvSpPr>
         <p:spPr>
           <a:xfrm>
-            <a:off x="4915660" y="2390600"/>
-            <a:ext cx="5336375" cy="419730"/>
-          </a:xfrm>
-          <a:prstGeom prst="rect">
-            <a:avLst/>
-          </a:prstGeom>
-        </p:spPr>
-        <p:txBody>
-          <a:bodyPr lIns="0" tIns="0" rIns="0" bIns="0" rtlCol="0" anchor="t">
+            <a:off x="4383496" y="2390600"/>
+            <a:ext cx="5868540" cy="419730"/>
+          </a:xfrm>
+          <a:prstGeom prst="rect">
+            <a:avLst/>
+          </a:prstGeom>
+        </p:spPr>
+        <p:txBody>
+          <a:bodyPr wrap="square" lIns="0" tIns="0" rIns="0" bIns="0" rtlCol="0" anchor="t">
             <a:spAutoFit/>
           </a:bodyPr>
           <a:lstStyle/>
@@ -7661,7 +7661,7 @@
         <p:grpSpPr>
           <a:xfrm>
             <a:off x="1075771" y="2171626"/>
-            <a:ext cx="3635316" cy="7458075"/>
+            <a:ext cx="3115229" cy="7458075"/>
             <a:chOff x="0" y="0"/>
             <a:chExt cx="1229724" cy="2522855"/>
           </a:xfrm>
@@ -7716,14 +7716,14 @@
         <p:spPr>
           <a:xfrm>
             <a:off x="1075771" y="2390600"/>
-            <a:ext cx="3635316" cy="419730"/>
-          </a:xfrm>
-          <a:prstGeom prst="rect">
-            <a:avLst/>
-          </a:prstGeom>
-        </p:spPr>
-        <p:txBody>
-          <a:bodyPr lIns="0" tIns="0" rIns="0" bIns="0" rtlCol="0" anchor="t">
+            <a:ext cx="3115229" cy="419730"/>
+          </a:xfrm>
+          <a:prstGeom prst="rect">
+            <a:avLst/>
+          </a:prstGeom>
+        </p:spPr>
+        <p:txBody>
+          <a:bodyPr wrap="square" lIns="0" tIns="0" rIns="0" bIns="0" rtlCol="0" anchor="t">
             <a:spAutoFit/>
           </a:bodyPr>
           <a:lstStyle/>
@@ -7794,7 +7794,7 @@
         <p:spPr>
           <a:xfrm>
             <a:off x="1075771" y="3172480"/>
-            <a:ext cx="3648629" cy="523220"/>
+            <a:ext cx="3115229" cy="523220"/>
           </a:xfrm>
           <a:prstGeom prst="rect">
             <a:avLst/>
@@ -7820,7 +7820,7 @@
                 <a:ea typeface="Open Sans 1" panose="020B0604020202020204" charset="0"/>
                 <a:cs typeface="Open Sans 1" panose="020B0604020202020204" charset="0"/>
               </a:rPr>
-              <a:t>US#01&lt;Cadastro&gt;</a:t>
+              <a:t>Banco de Dados</a:t>
             </a:r>
           </a:p>
         </p:txBody>
@@ -7833,8 +7833,8 @@
         </p:nvSpPr>
         <p:spPr>
           <a:xfrm>
-            <a:off x="4910335" y="3149619"/>
-            <a:ext cx="5341700" cy="523220"/>
+            <a:off x="4383495" y="3149619"/>
+            <a:ext cx="5868540" cy="400110"/>
           </a:xfrm>
           <a:prstGeom prst="rect">
             <a:avLst/>
@@ -7849,7 +7849,7 @@
           <a:p>
             <a:pPr algn="ctr"/>
             <a:r>
-              <a:rPr lang="pt-BR" sz="2800" dirty="0">
+              <a:rPr lang="pt-BR" sz="2000" dirty="0">
                 <a:solidFill>
                   <a:schemeClr val="tx1">
                     <a:lumMod val="75000"/>
@@ -7860,7 +7860,7 @@
                 <a:ea typeface="Open Sans 1" panose="020B0604020202020204" charset="0"/>
                 <a:cs typeface="Open Sans 1" panose="020B0604020202020204" charset="0"/>
               </a:rPr>
-              <a:t>Cadastro da maquina</a:t>
+              <a:t>O software deve estar na nuvem Azure</a:t>
             </a:r>
           </a:p>
         </p:txBody>
@@ -7940,7 +7940,7 @@
                 <a:ea typeface="Open Sans 1" panose="020B0604020202020204" charset="0"/>
                 <a:cs typeface="Open Sans 1" panose="020B0604020202020204" charset="0"/>
               </a:rPr>
-              <a:t>Grande</a:t>
+              <a:t>8</a:t>
             </a:r>
           </a:p>
         </p:txBody>
@@ -7954,6 +7954,726 @@
         <p:spPr>
           <a:xfrm>
             <a:off x="16133593" y="3172480"/>
+            <a:ext cx="1919054" cy="400110"/>
+          </a:xfrm>
+          <a:prstGeom prst="rect">
+            <a:avLst/>
+          </a:prstGeom>
+          <a:noFill/>
+        </p:spPr>
+        <p:txBody>
+          <a:bodyPr wrap="square" rtlCol="0">
+            <a:spAutoFit/>
+          </a:bodyPr>
+          <a:lstStyle/>
+          <a:p>
+            <a:pPr algn="ctr"/>
+            <a:r>
+              <a:rPr lang="pt-BR" sz="2000" dirty="0">
+                <a:solidFill>
+                  <a:schemeClr val="tx1">
+                    <a:lumMod val="75000"/>
+                    <a:lumOff val="25000"/>
+                  </a:schemeClr>
+                </a:solidFill>
+                <a:latin typeface="Open Sans 1" panose="020B0604020202020204" charset="0"/>
+                <a:ea typeface="Open Sans 1" panose="020B0604020202020204" charset="0"/>
+                <a:cs typeface="Open Sans 1" panose="020B0604020202020204" charset="0"/>
+              </a:rPr>
+              <a:t>Não Funcional</a:t>
+            </a:r>
+          </a:p>
+        </p:txBody>
+      </p:sp>
+      <p:sp>
+        <p:nvSpPr>
+          <p:cNvPr id="155" name="CaixaDeTexto 154"/>
+          <p:cNvSpPr txBox="1"/>
+          <p:nvPr/>
+        </p:nvSpPr>
+        <p:spPr>
+          <a:xfrm>
+            <a:off x="237571" y="3794761"/>
+            <a:ext cx="660197" cy="523220"/>
+          </a:xfrm>
+          <a:prstGeom prst="rect">
+            <a:avLst/>
+          </a:prstGeom>
+          <a:noFill/>
+        </p:spPr>
+        <p:txBody>
+          <a:bodyPr wrap="square" rtlCol="0">
+            <a:spAutoFit/>
+          </a:bodyPr>
+          <a:lstStyle/>
+          <a:p>
+            <a:pPr algn="ctr"/>
+            <a:r>
+              <a:rPr lang="pt-BR" sz="2800" dirty="0">
+                <a:solidFill>
+                  <a:schemeClr val="tx1">
+                    <a:lumMod val="75000"/>
+                    <a:lumOff val="25000"/>
+                  </a:schemeClr>
+                </a:solidFill>
+                <a:latin typeface="Open Sans 1" panose="020B0604020202020204" charset="0"/>
+                <a:ea typeface="Open Sans 1" panose="020B0604020202020204" charset="0"/>
+                <a:cs typeface="Open Sans 1" panose="020B0604020202020204" charset="0"/>
+              </a:rPr>
+              <a:t>02</a:t>
+            </a:r>
+          </a:p>
+        </p:txBody>
+      </p:sp>
+      <p:sp>
+        <p:nvSpPr>
+          <p:cNvPr id="156" name="CaixaDeTexto 155"/>
+          <p:cNvSpPr txBox="1"/>
+          <p:nvPr/>
+        </p:nvSpPr>
+        <p:spPr>
+          <a:xfrm>
+            <a:off x="1075771" y="3794761"/>
+            <a:ext cx="3115229" cy="523220"/>
+          </a:xfrm>
+          <a:prstGeom prst="rect">
+            <a:avLst/>
+          </a:prstGeom>
+          <a:noFill/>
+        </p:spPr>
+        <p:txBody>
+          <a:bodyPr wrap="square" rtlCol="0">
+            <a:spAutoFit/>
+          </a:bodyPr>
+          <a:lstStyle/>
+          <a:p>
+            <a:pPr algn="ctr"/>
+            <a:r>
+              <a:rPr lang="pt-BR" sz="2800" dirty="0">
+                <a:solidFill>
+                  <a:schemeClr val="tx1">
+                    <a:lumMod val="75000"/>
+                    <a:lumOff val="25000"/>
+                  </a:schemeClr>
+                </a:solidFill>
+                <a:latin typeface="Open Sans 1" panose="020B0604020202020204" charset="0"/>
+                <a:ea typeface="Open Sans 1" panose="020B0604020202020204" charset="0"/>
+                <a:cs typeface="Open Sans 1" panose="020B0604020202020204" charset="0"/>
+              </a:rPr>
+              <a:t>Aplicação</a:t>
+            </a:r>
+          </a:p>
+        </p:txBody>
+      </p:sp>
+      <p:sp>
+        <p:nvSpPr>
+          <p:cNvPr id="157" name="CaixaDeTexto 156"/>
+          <p:cNvSpPr txBox="1"/>
+          <p:nvPr/>
+        </p:nvSpPr>
+        <p:spPr>
+          <a:xfrm>
+            <a:off x="4404260" y="3771900"/>
+            <a:ext cx="5847775" cy="607099"/>
+          </a:xfrm>
+          <a:prstGeom prst="rect">
+            <a:avLst/>
+          </a:prstGeom>
+          <a:noFill/>
+        </p:spPr>
+        <p:txBody>
+          <a:bodyPr wrap="square" rtlCol="0">
+            <a:spAutoFit/>
+          </a:bodyPr>
+          <a:lstStyle/>
+          <a:p>
+            <a:pPr algn="ctr"/>
+            <a:r>
+              <a:rPr lang="pt-BR" sz="1600" dirty="0">
+                <a:solidFill>
+                  <a:schemeClr val="tx1">
+                    <a:lumMod val="75000"/>
+                    <a:lumOff val="25000"/>
+                  </a:schemeClr>
+                </a:solidFill>
+                <a:latin typeface="Open Sans 1" panose="020B0604020202020204" charset="0"/>
+                <a:ea typeface="Open Sans 1" panose="020B0604020202020204" charset="0"/>
+                <a:cs typeface="Open Sans 1" panose="020B0604020202020204" charset="0"/>
+              </a:rPr>
+              <a:t>O software deve ter uma API Java que capture os dados de processamento dos computadores</a:t>
+            </a:r>
+          </a:p>
+        </p:txBody>
+      </p:sp>
+      <p:sp>
+        <p:nvSpPr>
+          <p:cNvPr id="158" name="CaixaDeTexto 157"/>
+          <p:cNvSpPr txBox="1"/>
+          <p:nvPr/>
+        </p:nvSpPr>
+        <p:spPr>
+          <a:xfrm>
+            <a:off x="10474821" y="3794761"/>
+            <a:ext cx="2981511" cy="523220"/>
+          </a:xfrm>
+          <a:prstGeom prst="rect">
+            <a:avLst/>
+          </a:prstGeom>
+          <a:noFill/>
+        </p:spPr>
+        <p:txBody>
+          <a:bodyPr wrap="square" rtlCol="0">
+            <a:spAutoFit/>
+          </a:bodyPr>
+          <a:lstStyle/>
+          <a:p>
+            <a:pPr algn="ctr"/>
+            <a:r>
+              <a:rPr lang="pt-BR" sz="2800" dirty="0">
+                <a:solidFill>
+                  <a:schemeClr val="tx1">
+                    <a:lumMod val="75000"/>
+                    <a:lumOff val="25000"/>
+                  </a:schemeClr>
+                </a:solidFill>
+                <a:latin typeface="Open Sans 1" panose="020B0604020202020204" charset="0"/>
+                <a:ea typeface="Open Sans 1" panose="020B0604020202020204" charset="0"/>
+                <a:cs typeface="Open Sans 1" panose="020B0604020202020204" charset="0"/>
+              </a:rPr>
+              <a:t>Essencial</a:t>
+            </a:r>
+          </a:p>
+        </p:txBody>
+      </p:sp>
+      <p:sp>
+        <p:nvSpPr>
+          <p:cNvPr id="159" name="CaixaDeTexto 158"/>
+          <p:cNvSpPr txBox="1"/>
+          <p:nvPr/>
+        </p:nvSpPr>
+        <p:spPr>
+          <a:xfrm>
+            <a:off x="13660016" y="3771900"/>
+            <a:ext cx="2272111" cy="523220"/>
+          </a:xfrm>
+          <a:prstGeom prst="rect">
+            <a:avLst/>
+          </a:prstGeom>
+          <a:noFill/>
+        </p:spPr>
+        <p:txBody>
+          <a:bodyPr wrap="square" rtlCol="0">
+            <a:spAutoFit/>
+          </a:bodyPr>
+          <a:lstStyle/>
+          <a:p>
+            <a:pPr algn="ctr"/>
+            <a:r>
+              <a:rPr lang="pt-BR" sz="2800" dirty="0">
+                <a:solidFill>
+                  <a:schemeClr val="tx1">
+                    <a:lumMod val="75000"/>
+                    <a:lumOff val="25000"/>
+                  </a:schemeClr>
+                </a:solidFill>
+                <a:latin typeface="Open Sans 1" panose="020B0604020202020204" charset="0"/>
+                <a:ea typeface="Open Sans 1" panose="020B0604020202020204" charset="0"/>
+                <a:cs typeface="Open Sans 1" panose="020B0604020202020204" charset="0"/>
+              </a:rPr>
+              <a:t>21</a:t>
+            </a:r>
+          </a:p>
+        </p:txBody>
+      </p:sp>
+      <p:sp>
+        <p:nvSpPr>
+          <p:cNvPr id="160" name="CaixaDeTexto 159"/>
+          <p:cNvSpPr txBox="1"/>
+          <p:nvPr/>
+        </p:nvSpPr>
+        <p:spPr>
+          <a:xfrm>
+            <a:off x="16133593" y="3794761"/>
+            <a:ext cx="1919054" cy="400110"/>
+          </a:xfrm>
+          <a:prstGeom prst="rect">
+            <a:avLst/>
+          </a:prstGeom>
+          <a:noFill/>
+        </p:spPr>
+        <p:txBody>
+          <a:bodyPr wrap="square" rtlCol="0">
+            <a:spAutoFit/>
+          </a:bodyPr>
+          <a:lstStyle/>
+          <a:p>
+            <a:pPr algn="ctr"/>
+            <a:r>
+              <a:rPr lang="pt-BR" sz="2000" dirty="0">
+                <a:solidFill>
+                  <a:schemeClr val="tx1">
+                    <a:lumMod val="75000"/>
+                    <a:lumOff val="25000"/>
+                  </a:schemeClr>
+                </a:solidFill>
+                <a:latin typeface="Open Sans 1" panose="020B0604020202020204" charset="0"/>
+                <a:ea typeface="Open Sans 1" panose="020B0604020202020204" charset="0"/>
+                <a:cs typeface="Open Sans 1" panose="020B0604020202020204" charset="0"/>
+              </a:rPr>
+              <a:t>Não Funcional</a:t>
+            </a:r>
+          </a:p>
+        </p:txBody>
+      </p:sp>
+      <p:sp>
+        <p:nvSpPr>
+          <p:cNvPr id="161" name="CaixaDeTexto 160"/>
+          <p:cNvSpPr txBox="1"/>
+          <p:nvPr/>
+        </p:nvSpPr>
+        <p:spPr>
+          <a:xfrm>
+            <a:off x="228600" y="4378999"/>
+            <a:ext cx="660197" cy="523220"/>
+          </a:xfrm>
+          <a:prstGeom prst="rect">
+            <a:avLst/>
+          </a:prstGeom>
+          <a:noFill/>
+        </p:spPr>
+        <p:txBody>
+          <a:bodyPr wrap="square" rtlCol="0">
+            <a:spAutoFit/>
+          </a:bodyPr>
+          <a:lstStyle/>
+          <a:p>
+            <a:pPr algn="ctr"/>
+            <a:r>
+              <a:rPr lang="pt-BR" sz="2800" dirty="0">
+                <a:solidFill>
+                  <a:schemeClr val="tx1">
+                    <a:lumMod val="75000"/>
+                    <a:lumOff val="25000"/>
+                  </a:schemeClr>
+                </a:solidFill>
+                <a:latin typeface="Open Sans 1" panose="020B0604020202020204" charset="0"/>
+                <a:ea typeface="Open Sans 1" panose="020B0604020202020204" charset="0"/>
+                <a:cs typeface="Open Sans 1" panose="020B0604020202020204" charset="0"/>
+              </a:rPr>
+              <a:t>03</a:t>
+            </a:r>
+          </a:p>
+        </p:txBody>
+      </p:sp>
+      <p:sp>
+        <p:nvSpPr>
+          <p:cNvPr id="162" name="CaixaDeTexto 161"/>
+          <p:cNvSpPr txBox="1"/>
+          <p:nvPr/>
+        </p:nvSpPr>
+        <p:spPr>
+          <a:xfrm>
+            <a:off x="1066801" y="4378999"/>
+            <a:ext cx="3124199" cy="523220"/>
+          </a:xfrm>
+          <a:prstGeom prst="rect">
+            <a:avLst/>
+          </a:prstGeom>
+          <a:noFill/>
+        </p:spPr>
+        <p:txBody>
+          <a:bodyPr wrap="square" rtlCol="0">
+            <a:spAutoFit/>
+          </a:bodyPr>
+          <a:lstStyle/>
+          <a:p>
+            <a:pPr algn="ctr"/>
+            <a:r>
+              <a:rPr lang="pt-BR" sz="2800" dirty="0">
+                <a:solidFill>
+                  <a:schemeClr val="tx1">
+                    <a:lumMod val="75000"/>
+                    <a:lumOff val="25000"/>
+                  </a:schemeClr>
+                </a:solidFill>
+                <a:latin typeface="Open Sans 1" panose="020B0604020202020204" charset="0"/>
+                <a:ea typeface="Open Sans 1" panose="020B0604020202020204" charset="0"/>
+                <a:cs typeface="Open Sans 1" panose="020B0604020202020204" charset="0"/>
+              </a:rPr>
+              <a:t>Aplicação</a:t>
+            </a:r>
+          </a:p>
+        </p:txBody>
+      </p:sp>
+      <p:sp>
+        <p:nvSpPr>
+          <p:cNvPr id="163" name="CaixaDeTexto 162"/>
+          <p:cNvSpPr txBox="1"/>
+          <p:nvPr/>
+        </p:nvSpPr>
+        <p:spPr>
+          <a:xfrm>
+            <a:off x="4404259" y="4356139"/>
+            <a:ext cx="5838805" cy="645142"/>
+          </a:xfrm>
+          <a:prstGeom prst="rect">
+            <a:avLst/>
+          </a:prstGeom>
+          <a:noFill/>
+        </p:spPr>
+        <p:txBody>
+          <a:bodyPr wrap="square" rtlCol="0">
+            <a:spAutoFit/>
+          </a:bodyPr>
+          <a:lstStyle/>
+          <a:p>
+            <a:pPr algn="ctr"/>
+            <a:r>
+              <a:rPr lang="pt-BR" dirty="0">
+                <a:solidFill>
+                  <a:schemeClr val="tx1">
+                    <a:lumMod val="75000"/>
+                    <a:lumOff val="25000"/>
+                  </a:schemeClr>
+                </a:solidFill>
+                <a:latin typeface="Open Sans 1" panose="020B0604020202020204" charset="0"/>
+                <a:ea typeface="Open Sans 1" panose="020B0604020202020204" charset="0"/>
+                <a:cs typeface="Open Sans 1" panose="020B0604020202020204" charset="0"/>
+              </a:rPr>
+              <a:t>O software deve ter uma API que monitore a rede das máquinas</a:t>
+            </a:r>
+          </a:p>
+        </p:txBody>
+      </p:sp>
+      <p:sp>
+        <p:nvSpPr>
+          <p:cNvPr id="164" name="CaixaDeTexto 163"/>
+          <p:cNvSpPr txBox="1"/>
+          <p:nvPr/>
+        </p:nvSpPr>
+        <p:spPr>
+          <a:xfrm>
+            <a:off x="10465850" y="4378999"/>
+            <a:ext cx="2981511" cy="523220"/>
+          </a:xfrm>
+          <a:prstGeom prst="rect">
+            <a:avLst/>
+          </a:prstGeom>
+          <a:noFill/>
+        </p:spPr>
+        <p:txBody>
+          <a:bodyPr wrap="square" rtlCol="0">
+            <a:spAutoFit/>
+          </a:bodyPr>
+          <a:lstStyle/>
+          <a:p>
+            <a:pPr algn="ctr"/>
+            <a:r>
+              <a:rPr lang="pt-BR" sz="2800" dirty="0">
+                <a:solidFill>
+                  <a:schemeClr val="tx1">
+                    <a:lumMod val="75000"/>
+                    <a:lumOff val="25000"/>
+                  </a:schemeClr>
+                </a:solidFill>
+                <a:latin typeface="Open Sans 1" panose="020B0604020202020204" charset="0"/>
+                <a:ea typeface="Open Sans 1" panose="020B0604020202020204" charset="0"/>
+                <a:cs typeface="Open Sans 1" panose="020B0604020202020204" charset="0"/>
+              </a:rPr>
+              <a:t>Essencial</a:t>
+            </a:r>
+          </a:p>
+        </p:txBody>
+      </p:sp>
+      <p:sp>
+        <p:nvSpPr>
+          <p:cNvPr id="165" name="CaixaDeTexto 164"/>
+          <p:cNvSpPr txBox="1"/>
+          <p:nvPr/>
+        </p:nvSpPr>
+        <p:spPr>
+          <a:xfrm>
+            <a:off x="13651045" y="4356138"/>
+            <a:ext cx="2272111" cy="523220"/>
+          </a:xfrm>
+          <a:prstGeom prst="rect">
+            <a:avLst/>
+          </a:prstGeom>
+          <a:noFill/>
+        </p:spPr>
+        <p:txBody>
+          <a:bodyPr wrap="square" rtlCol="0">
+            <a:spAutoFit/>
+          </a:bodyPr>
+          <a:lstStyle/>
+          <a:p>
+            <a:pPr algn="ctr"/>
+            <a:r>
+              <a:rPr lang="pt-BR" sz="2800" dirty="0">
+                <a:solidFill>
+                  <a:schemeClr val="tx1">
+                    <a:lumMod val="75000"/>
+                    <a:lumOff val="25000"/>
+                  </a:schemeClr>
+                </a:solidFill>
+                <a:latin typeface="Open Sans 1" panose="020B0604020202020204" charset="0"/>
+                <a:ea typeface="Open Sans 1" panose="020B0604020202020204" charset="0"/>
+                <a:cs typeface="Open Sans 1" panose="020B0604020202020204" charset="0"/>
+              </a:rPr>
+              <a:t>21</a:t>
+            </a:r>
+          </a:p>
+        </p:txBody>
+      </p:sp>
+      <p:sp>
+        <p:nvSpPr>
+          <p:cNvPr id="166" name="CaixaDeTexto 165"/>
+          <p:cNvSpPr txBox="1"/>
+          <p:nvPr/>
+        </p:nvSpPr>
+        <p:spPr>
+          <a:xfrm>
+            <a:off x="16124622" y="4438590"/>
+            <a:ext cx="1919054" cy="400110"/>
+          </a:xfrm>
+          <a:prstGeom prst="rect">
+            <a:avLst/>
+          </a:prstGeom>
+          <a:noFill/>
+        </p:spPr>
+        <p:txBody>
+          <a:bodyPr wrap="square" rtlCol="0">
+            <a:spAutoFit/>
+          </a:bodyPr>
+          <a:lstStyle/>
+          <a:p>
+            <a:pPr algn="ctr"/>
+            <a:r>
+              <a:rPr lang="pt-BR" sz="2000" dirty="0">
+                <a:solidFill>
+                  <a:schemeClr val="tx1">
+                    <a:lumMod val="75000"/>
+                    <a:lumOff val="25000"/>
+                  </a:schemeClr>
+                </a:solidFill>
+                <a:latin typeface="Open Sans 1" panose="020B0604020202020204" charset="0"/>
+                <a:ea typeface="Open Sans 1" panose="020B0604020202020204" charset="0"/>
+                <a:cs typeface="Open Sans 1" panose="020B0604020202020204" charset="0"/>
+              </a:rPr>
+              <a:t>Não Funcional</a:t>
+            </a:r>
+          </a:p>
+        </p:txBody>
+      </p:sp>
+      <p:sp>
+        <p:nvSpPr>
+          <p:cNvPr id="167" name="CaixaDeTexto 166"/>
+          <p:cNvSpPr txBox="1"/>
+          <p:nvPr/>
+        </p:nvSpPr>
+        <p:spPr>
+          <a:xfrm>
+            <a:off x="228600" y="5001280"/>
+            <a:ext cx="660197" cy="523220"/>
+          </a:xfrm>
+          <a:prstGeom prst="rect">
+            <a:avLst/>
+          </a:prstGeom>
+          <a:noFill/>
+        </p:spPr>
+        <p:txBody>
+          <a:bodyPr wrap="square" rtlCol="0">
+            <a:spAutoFit/>
+          </a:bodyPr>
+          <a:lstStyle/>
+          <a:p>
+            <a:pPr algn="ctr"/>
+            <a:r>
+              <a:rPr lang="pt-BR" sz="2800" dirty="0">
+                <a:solidFill>
+                  <a:schemeClr val="tx1">
+                    <a:lumMod val="75000"/>
+                    <a:lumOff val="25000"/>
+                  </a:schemeClr>
+                </a:solidFill>
+                <a:latin typeface="Open Sans 1" panose="020B0604020202020204" charset="0"/>
+                <a:ea typeface="Open Sans 1" panose="020B0604020202020204" charset="0"/>
+                <a:cs typeface="Open Sans 1" panose="020B0604020202020204" charset="0"/>
+              </a:rPr>
+              <a:t>04</a:t>
+            </a:r>
+          </a:p>
+        </p:txBody>
+      </p:sp>
+      <p:sp>
+        <p:nvSpPr>
+          <p:cNvPr id="168" name="CaixaDeTexto 167"/>
+          <p:cNvSpPr txBox="1"/>
+          <p:nvPr/>
+        </p:nvSpPr>
+        <p:spPr>
+          <a:xfrm>
+            <a:off x="1066801" y="5001280"/>
+            <a:ext cx="3124199" cy="523220"/>
+          </a:xfrm>
+          <a:prstGeom prst="rect">
+            <a:avLst/>
+          </a:prstGeom>
+          <a:noFill/>
+        </p:spPr>
+        <p:txBody>
+          <a:bodyPr wrap="square" rtlCol="0">
+            <a:spAutoFit/>
+          </a:bodyPr>
+          <a:lstStyle/>
+          <a:p>
+            <a:pPr algn="ctr"/>
+            <a:r>
+              <a:rPr lang="pt-BR" sz="2800" dirty="0">
+                <a:solidFill>
+                  <a:schemeClr val="tx1">
+                    <a:lumMod val="75000"/>
+                    <a:lumOff val="25000"/>
+                  </a:schemeClr>
+                </a:solidFill>
+                <a:latin typeface="Open Sans 1" panose="020B0604020202020204" charset="0"/>
+                <a:ea typeface="Open Sans 1" panose="020B0604020202020204" charset="0"/>
+                <a:cs typeface="Open Sans 1" panose="020B0604020202020204" charset="0"/>
+              </a:rPr>
+              <a:t>Aplicação</a:t>
+            </a:r>
+          </a:p>
+        </p:txBody>
+      </p:sp>
+      <p:sp>
+        <p:nvSpPr>
+          <p:cNvPr id="169" name="CaixaDeTexto 168"/>
+          <p:cNvSpPr txBox="1"/>
+          <p:nvPr/>
+        </p:nvSpPr>
+        <p:spPr>
+          <a:xfrm>
+            <a:off x="4383495" y="4978419"/>
+            <a:ext cx="5859569" cy="646331"/>
+          </a:xfrm>
+          <a:prstGeom prst="rect">
+            <a:avLst/>
+          </a:prstGeom>
+          <a:noFill/>
+        </p:spPr>
+        <p:txBody>
+          <a:bodyPr wrap="square" rtlCol="0">
+            <a:spAutoFit/>
+          </a:bodyPr>
+          <a:lstStyle/>
+          <a:p>
+            <a:pPr algn="ctr"/>
+            <a:r>
+              <a:rPr lang="pt-BR" dirty="0">
+                <a:solidFill>
+                  <a:schemeClr val="tx1">
+                    <a:lumMod val="75000"/>
+                    <a:lumOff val="25000"/>
+                  </a:schemeClr>
+                </a:solidFill>
+                <a:latin typeface="Open Sans 1" panose="020B0604020202020204" charset="0"/>
+                <a:ea typeface="Open Sans 1" panose="020B0604020202020204" charset="0"/>
+                <a:cs typeface="Open Sans 1" panose="020B0604020202020204" charset="0"/>
+              </a:rPr>
+              <a:t>O software deve capturar se a máquina está ligada ou desligada</a:t>
+            </a:r>
+          </a:p>
+        </p:txBody>
+      </p:sp>
+      <p:sp>
+        <p:nvSpPr>
+          <p:cNvPr id="170" name="CaixaDeTexto 169"/>
+          <p:cNvSpPr txBox="1"/>
+          <p:nvPr/>
+        </p:nvSpPr>
+        <p:spPr>
+          <a:xfrm>
+            <a:off x="10465850" y="5001280"/>
+            <a:ext cx="2981511" cy="523220"/>
+          </a:xfrm>
+          <a:prstGeom prst="rect">
+            <a:avLst/>
+          </a:prstGeom>
+          <a:noFill/>
+        </p:spPr>
+        <p:txBody>
+          <a:bodyPr wrap="square" rtlCol="0">
+            <a:spAutoFit/>
+          </a:bodyPr>
+          <a:lstStyle/>
+          <a:p>
+            <a:pPr algn="ctr"/>
+            <a:r>
+              <a:rPr lang="pt-BR" sz="2800" dirty="0">
+                <a:solidFill>
+                  <a:schemeClr val="tx1">
+                    <a:lumMod val="75000"/>
+                    <a:lumOff val="25000"/>
+                  </a:schemeClr>
+                </a:solidFill>
+                <a:latin typeface="Open Sans 1" panose="020B0604020202020204" charset="0"/>
+                <a:ea typeface="Open Sans 1" panose="020B0604020202020204" charset="0"/>
+                <a:cs typeface="Open Sans 1" panose="020B0604020202020204" charset="0"/>
+              </a:rPr>
+              <a:t>Importante</a:t>
+            </a:r>
+          </a:p>
+        </p:txBody>
+      </p:sp>
+      <p:sp>
+        <p:nvSpPr>
+          <p:cNvPr id="171" name="CaixaDeTexto 170"/>
+          <p:cNvSpPr txBox="1"/>
+          <p:nvPr/>
+        </p:nvSpPr>
+        <p:spPr>
+          <a:xfrm>
+            <a:off x="13651045" y="4978419"/>
+            <a:ext cx="2272111" cy="523220"/>
+          </a:xfrm>
+          <a:prstGeom prst="rect">
+            <a:avLst/>
+          </a:prstGeom>
+          <a:noFill/>
+        </p:spPr>
+        <p:txBody>
+          <a:bodyPr wrap="square" rtlCol="0">
+            <a:spAutoFit/>
+          </a:bodyPr>
+          <a:lstStyle/>
+          <a:p>
+            <a:pPr algn="ctr"/>
+            <a:r>
+              <a:rPr lang="pt-BR" sz="2800" dirty="0">
+                <a:solidFill>
+                  <a:schemeClr val="tx1">
+                    <a:lumMod val="75000"/>
+                    <a:lumOff val="25000"/>
+                  </a:schemeClr>
+                </a:solidFill>
+                <a:latin typeface="Open Sans 1" panose="020B0604020202020204" charset="0"/>
+                <a:ea typeface="Open Sans 1" panose="020B0604020202020204" charset="0"/>
+                <a:cs typeface="Open Sans 1" panose="020B0604020202020204" charset="0"/>
+              </a:rPr>
+              <a:t>21</a:t>
+            </a:r>
+          </a:p>
+        </p:txBody>
+      </p:sp>
+      <p:sp>
+        <p:nvSpPr>
+          <p:cNvPr id="172" name="CaixaDeTexto 171"/>
+          <p:cNvSpPr txBox="1"/>
+          <p:nvPr/>
+        </p:nvSpPr>
+        <p:spPr>
+          <a:xfrm>
+            <a:off x="16124622" y="5001280"/>
             <a:ext cx="1919054" cy="523220"/>
           </a:xfrm>
           <a:prstGeom prst="rect">
@@ -7987,13 +8707,13 @@
       </p:sp>
       <p:sp>
         <p:nvSpPr>
-          <p:cNvPr id="155" name="CaixaDeTexto 154"/>
+          <p:cNvPr id="173" name="CaixaDeTexto 172"/>
           <p:cNvSpPr txBox="1"/>
           <p:nvPr/>
         </p:nvSpPr>
         <p:spPr>
           <a:xfrm>
-            <a:off x="237571" y="3794761"/>
+            <a:off x="244324" y="5610880"/>
             <a:ext cx="660197" cy="523220"/>
           </a:xfrm>
           <a:prstGeom prst="rect">
@@ -8020,21 +8740,21 @@
                 <a:ea typeface="Open Sans 1" panose="020B0604020202020204" charset="0"/>
                 <a:cs typeface="Open Sans 1" panose="020B0604020202020204" charset="0"/>
               </a:rPr>
-              <a:t>01</a:t>
-            </a:r>
-          </a:p>
-        </p:txBody>
-      </p:sp>
-      <p:sp>
-        <p:nvSpPr>
-          <p:cNvPr id="156" name="CaixaDeTexto 155"/>
+              <a:t>05</a:t>
+            </a:r>
+          </a:p>
+        </p:txBody>
+      </p:sp>
+      <p:sp>
+        <p:nvSpPr>
+          <p:cNvPr id="174" name="CaixaDeTexto 173"/>
           <p:cNvSpPr txBox="1"/>
           <p:nvPr/>
         </p:nvSpPr>
         <p:spPr>
           <a:xfrm>
-            <a:off x="1075771" y="3794761"/>
-            <a:ext cx="3648629" cy="523220"/>
+            <a:off x="1082524" y="5610880"/>
+            <a:ext cx="3115229" cy="523220"/>
           </a:xfrm>
           <a:prstGeom prst="rect">
             <a:avLst/>
@@ -8060,21 +8780,21 @@
                 <a:ea typeface="Open Sans 1" panose="020B0604020202020204" charset="0"/>
                 <a:cs typeface="Open Sans 1" panose="020B0604020202020204" charset="0"/>
               </a:rPr>
-              <a:t>US#01&lt;Cadastro&gt;</a:t>
-            </a:r>
-          </a:p>
-        </p:txBody>
-      </p:sp>
-      <p:sp>
-        <p:nvSpPr>
-          <p:cNvPr id="157" name="CaixaDeTexto 156"/>
+              <a:t>Site</a:t>
+            </a:r>
+          </a:p>
+        </p:txBody>
+      </p:sp>
+      <p:sp>
+        <p:nvSpPr>
+          <p:cNvPr id="175" name="CaixaDeTexto 174"/>
           <p:cNvSpPr txBox="1"/>
           <p:nvPr/>
         </p:nvSpPr>
         <p:spPr>
           <a:xfrm>
-            <a:off x="4910335" y="3771900"/>
-            <a:ext cx="5341700" cy="523220"/>
+            <a:off x="4404259" y="5657790"/>
+            <a:ext cx="5854529" cy="400110"/>
           </a:xfrm>
           <a:prstGeom prst="rect">
             <a:avLst/>
@@ -8089,7 +8809,7 @@
           <a:p>
             <a:pPr algn="ctr"/>
             <a:r>
-              <a:rPr lang="pt-BR" sz="2800" dirty="0">
+              <a:rPr lang="pt-BR" sz="2000" dirty="0">
                 <a:solidFill>
                   <a:schemeClr val="tx1">
                     <a:lumMod val="75000"/>
@@ -8100,20 +8820,20 @@
                 <a:ea typeface="Open Sans 1" panose="020B0604020202020204" charset="0"/>
                 <a:cs typeface="Open Sans 1" panose="020B0604020202020204" charset="0"/>
               </a:rPr>
-              <a:t>Cadastro da maquina</a:t>
-            </a:r>
-          </a:p>
-        </p:txBody>
-      </p:sp>
-      <p:sp>
-        <p:nvSpPr>
-          <p:cNvPr id="158" name="CaixaDeTexto 157"/>
+              <a:t>O sistema deve ter um site institucional</a:t>
+            </a:r>
+          </a:p>
+        </p:txBody>
+      </p:sp>
+      <p:sp>
+        <p:nvSpPr>
+          <p:cNvPr id="176" name="CaixaDeTexto 175"/>
           <p:cNvSpPr txBox="1"/>
           <p:nvPr/>
         </p:nvSpPr>
         <p:spPr>
           <a:xfrm>
-            <a:off x="10474821" y="3794761"/>
+            <a:off x="10481574" y="5610880"/>
             <a:ext cx="2981511" cy="523220"/>
           </a:xfrm>
           <a:prstGeom prst="rect">
@@ -8147,13 +8867,13 @@
       </p:sp>
       <p:sp>
         <p:nvSpPr>
-          <p:cNvPr id="159" name="CaixaDeTexto 158"/>
+          <p:cNvPr id="177" name="CaixaDeTexto 176"/>
           <p:cNvSpPr txBox="1"/>
           <p:nvPr/>
         </p:nvSpPr>
         <p:spPr>
           <a:xfrm>
-            <a:off x="13660016" y="3771900"/>
+            <a:off x="13666769" y="5588019"/>
             <a:ext cx="2272111" cy="523220"/>
           </a:xfrm>
           <a:prstGeom prst="rect">
@@ -8180,20 +8900,220 @@
                 <a:ea typeface="Open Sans 1" panose="020B0604020202020204" charset="0"/>
                 <a:cs typeface="Open Sans 1" panose="020B0604020202020204" charset="0"/>
               </a:rPr>
-              <a:t>Grande</a:t>
-            </a:r>
-          </a:p>
-        </p:txBody>
-      </p:sp>
-      <p:sp>
-        <p:nvSpPr>
-          <p:cNvPr id="160" name="CaixaDeTexto 159"/>
+              <a:t>3</a:t>
+            </a:r>
+          </a:p>
+        </p:txBody>
+      </p:sp>
+      <p:sp>
+        <p:nvSpPr>
+          <p:cNvPr id="178" name="CaixaDeTexto 177"/>
           <p:cNvSpPr txBox="1"/>
           <p:nvPr/>
         </p:nvSpPr>
         <p:spPr>
           <a:xfrm>
-            <a:off x="16133593" y="3794761"/>
+            <a:off x="16140346" y="5676900"/>
+            <a:ext cx="1919054" cy="400110"/>
+          </a:xfrm>
+          <a:prstGeom prst="rect">
+            <a:avLst/>
+          </a:prstGeom>
+          <a:noFill/>
+        </p:spPr>
+        <p:txBody>
+          <a:bodyPr wrap="square" rtlCol="0">
+            <a:spAutoFit/>
+          </a:bodyPr>
+          <a:lstStyle/>
+          <a:p>
+            <a:pPr algn="ctr"/>
+            <a:r>
+              <a:rPr lang="pt-BR" sz="2000" dirty="0">
+                <a:solidFill>
+                  <a:schemeClr val="tx1">
+                    <a:lumMod val="75000"/>
+                    <a:lumOff val="25000"/>
+                  </a:schemeClr>
+                </a:solidFill>
+                <a:latin typeface="Open Sans 1" panose="020B0604020202020204" charset="0"/>
+                <a:ea typeface="Open Sans 1" panose="020B0604020202020204" charset="0"/>
+                <a:cs typeface="Open Sans 1" panose="020B0604020202020204" charset="0"/>
+              </a:rPr>
+              <a:t>Não Funcional</a:t>
+            </a:r>
+          </a:p>
+        </p:txBody>
+      </p:sp>
+      <p:sp>
+        <p:nvSpPr>
+          <p:cNvPr id="179" name="CaixaDeTexto 178"/>
+          <p:cNvSpPr txBox="1"/>
+          <p:nvPr/>
+        </p:nvSpPr>
+        <p:spPr>
+          <a:xfrm>
+            <a:off x="244324" y="6233161"/>
+            <a:ext cx="660197" cy="523220"/>
+          </a:xfrm>
+          <a:prstGeom prst="rect">
+            <a:avLst/>
+          </a:prstGeom>
+          <a:noFill/>
+        </p:spPr>
+        <p:txBody>
+          <a:bodyPr wrap="square" rtlCol="0">
+            <a:spAutoFit/>
+          </a:bodyPr>
+          <a:lstStyle/>
+          <a:p>
+            <a:pPr algn="ctr"/>
+            <a:r>
+              <a:rPr lang="pt-BR" sz="2800" dirty="0">
+                <a:solidFill>
+                  <a:schemeClr val="tx1">
+                    <a:lumMod val="75000"/>
+                    <a:lumOff val="25000"/>
+                  </a:schemeClr>
+                </a:solidFill>
+                <a:latin typeface="Open Sans 1" panose="020B0604020202020204" charset="0"/>
+                <a:ea typeface="Open Sans 1" panose="020B0604020202020204" charset="0"/>
+                <a:cs typeface="Open Sans 1" panose="020B0604020202020204" charset="0"/>
+              </a:rPr>
+              <a:t>06</a:t>
+            </a:r>
+          </a:p>
+        </p:txBody>
+      </p:sp>
+      <p:sp>
+        <p:nvSpPr>
+          <p:cNvPr id="181" name="CaixaDeTexto 180"/>
+          <p:cNvSpPr txBox="1"/>
+          <p:nvPr/>
+        </p:nvSpPr>
+        <p:spPr>
+          <a:xfrm>
+            <a:off x="4403507" y="6210300"/>
+            <a:ext cx="5855281" cy="584775"/>
+          </a:xfrm>
+          <a:prstGeom prst="rect">
+            <a:avLst/>
+          </a:prstGeom>
+          <a:noFill/>
+        </p:spPr>
+        <p:txBody>
+          <a:bodyPr wrap="square" rtlCol="0">
+            <a:spAutoFit/>
+          </a:bodyPr>
+          <a:lstStyle/>
+          <a:p>
+            <a:pPr algn="ctr"/>
+            <a:r>
+              <a:rPr lang="pt-BR" sz="1600" dirty="0">
+                <a:solidFill>
+                  <a:schemeClr val="tx1">
+                    <a:lumMod val="75000"/>
+                    <a:lumOff val="25000"/>
+                  </a:schemeClr>
+                </a:solidFill>
+                <a:latin typeface="Open Sans 1" panose="020B0604020202020204" charset="0"/>
+                <a:ea typeface="Open Sans 1" panose="020B0604020202020204" charset="0"/>
+                <a:cs typeface="Open Sans 1" panose="020B0604020202020204" charset="0"/>
+              </a:rPr>
+              <a:t>A aplicação web deve ter uma dashboard com os dados de processamentos das máquinas em tempo real</a:t>
+            </a:r>
+          </a:p>
+        </p:txBody>
+      </p:sp>
+      <p:sp>
+        <p:nvSpPr>
+          <p:cNvPr id="182" name="CaixaDeTexto 181"/>
+          <p:cNvSpPr txBox="1"/>
+          <p:nvPr/>
+        </p:nvSpPr>
+        <p:spPr>
+          <a:xfrm>
+            <a:off x="10481574" y="6233161"/>
+            <a:ext cx="2981511" cy="523220"/>
+          </a:xfrm>
+          <a:prstGeom prst="rect">
+            <a:avLst/>
+          </a:prstGeom>
+          <a:noFill/>
+        </p:spPr>
+        <p:txBody>
+          <a:bodyPr wrap="square" rtlCol="0">
+            <a:spAutoFit/>
+          </a:bodyPr>
+          <a:lstStyle/>
+          <a:p>
+            <a:pPr algn="ctr"/>
+            <a:r>
+              <a:rPr lang="pt-BR" sz="2800" dirty="0">
+                <a:solidFill>
+                  <a:schemeClr val="tx1">
+                    <a:lumMod val="75000"/>
+                    <a:lumOff val="25000"/>
+                  </a:schemeClr>
+                </a:solidFill>
+                <a:latin typeface="Open Sans 1" panose="020B0604020202020204" charset="0"/>
+                <a:ea typeface="Open Sans 1" panose="020B0604020202020204" charset="0"/>
+                <a:cs typeface="Open Sans 1" panose="020B0604020202020204" charset="0"/>
+              </a:rPr>
+              <a:t>Essencial</a:t>
+            </a:r>
+          </a:p>
+        </p:txBody>
+      </p:sp>
+      <p:sp>
+        <p:nvSpPr>
+          <p:cNvPr id="183" name="CaixaDeTexto 182"/>
+          <p:cNvSpPr txBox="1"/>
+          <p:nvPr/>
+        </p:nvSpPr>
+        <p:spPr>
+          <a:xfrm>
+            <a:off x="13666769" y="6210300"/>
+            <a:ext cx="2272111" cy="523220"/>
+          </a:xfrm>
+          <a:prstGeom prst="rect">
+            <a:avLst/>
+          </a:prstGeom>
+          <a:noFill/>
+        </p:spPr>
+        <p:txBody>
+          <a:bodyPr wrap="square" rtlCol="0">
+            <a:spAutoFit/>
+          </a:bodyPr>
+          <a:lstStyle/>
+          <a:p>
+            <a:pPr algn="ctr"/>
+            <a:r>
+              <a:rPr lang="pt-BR" sz="2800" dirty="0">
+                <a:solidFill>
+                  <a:schemeClr val="tx1">
+                    <a:lumMod val="75000"/>
+                    <a:lumOff val="25000"/>
+                  </a:schemeClr>
+                </a:solidFill>
+                <a:latin typeface="Open Sans 1" panose="020B0604020202020204" charset="0"/>
+                <a:ea typeface="Open Sans 1" panose="020B0604020202020204" charset="0"/>
+                <a:cs typeface="Open Sans 1" panose="020B0604020202020204" charset="0"/>
+              </a:rPr>
+              <a:t>13</a:t>
+            </a:r>
+          </a:p>
+        </p:txBody>
+      </p:sp>
+      <p:sp>
+        <p:nvSpPr>
+          <p:cNvPr id="184" name="CaixaDeTexto 183"/>
+          <p:cNvSpPr txBox="1"/>
+          <p:nvPr/>
+        </p:nvSpPr>
+        <p:spPr>
+          <a:xfrm>
+            <a:off x="16140346" y="6233161"/>
             <a:ext cx="1919054" cy="523220"/>
           </a:xfrm>
           <a:prstGeom prst="rect">
@@ -8227,14 +9147,14 @@
       </p:sp>
       <p:sp>
         <p:nvSpPr>
-          <p:cNvPr id="161" name="CaixaDeTexto 160"/>
+          <p:cNvPr id="187" name="CaixaDeTexto 186"/>
           <p:cNvSpPr txBox="1"/>
           <p:nvPr/>
         </p:nvSpPr>
         <p:spPr>
           <a:xfrm>
-            <a:off x="228600" y="4378999"/>
-            <a:ext cx="660197" cy="523220"/>
+            <a:off x="4383495" y="6794538"/>
+            <a:ext cx="5866322" cy="646331"/>
           </a:xfrm>
           <a:prstGeom prst="rect">
             <a:avLst/>
@@ -8249,7 +9169,7 @@
           <a:p>
             <a:pPr algn="ctr"/>
             <a:r>
-              <a:rPr lang="pt-BR" sz="2800" dirty="0">
+              <a:rPr lang="pt-BR" dirty="0">
                 <a:solidFill>
                   <a:schemeClr val="tx1">
                     <a:lumMod val="75000"/>
@@ -8260,100 +9180,20 @@
                 <a:ea typeface="Open Sans 1" panose="020B0604020202020204" charset="0"/>
                 <a:cs typeface="Open Sans 1" panose="020B0604020202020204" charset="0"/>
               </a:rPr>
-              <a:t>01</a:t>
-            </a:r>
-          </a:p>
-        </p:txBody>
-      </p:sp>
-      <p:sp>
-        <p:nvSpPr>
-          <p:cNvPr id="162" name="CaixaDeTexto 161"/>
+              <a:t>A aplicação web deve emitir alertas na existência de alteração no desempenho do computador</a:t>
+            </a:r>
+          </a:p>
+        </p:txBody>
+      </p:sp>
+      <p:sp>
+        <p:nvSpPr>
+          <p:cNvPr id="188" name="CaixaDeTexto 187"/>
           <p:cNvSpPr txBox="1"/>
           <p:nvPr/>
         </p:nvSpPr>
         <p:spPr>
           <a:xfrm>
-            <a:off x="1066800" y="4378999"/>
-            <a:ext cx="3648629" cy="523220"/>
-          </a:xfrm>
-          <a:prstGeom prst="rect">
-            <a:avLst/>
-          </a:prstGeom>
-          <a:noFill/>
-        </p:spPr>
-        <p:txBody>
-          <a:bodyPr wrap="square" rtlCol="0">
-            <a:spAutoFit/>
-          </a:bodyPr>
-          <a:lstStyle/>
-          <a:p>
-            <a:pPr algn="ctr"/>
-            <a:r>
-              <a:rPr lang="pt-BR" sz="2800" dirty="0">
-                <a:solidFill>
-                  <a:schemeClr val="tx1">
-                    <a:lumMod val="75000"/>
-                    <a:lumOff val="25000"/>
-                  </a:schemeClr>
-                </a:solidFill>
-                <a:latin typeface="Open Sans 1" panose="020B0604020202020204" charset="0"/>
-                <a:ea typeface="Open Sans 1" panose="020B0604020202020204" charset="0"/>
-                <a:cs typeface="Open Sans 1" panose="020B0604020202020204" charset="0"/>
-              </a:rPr>
-              <a:t>US#01&lt;Cadastro&gt;</a:t>
-            </a:r>
-          </a:p>
-        </p:txBody>
-      </p:sp>
-      <p:sp>
-        <p:nvSpPr>
-          <p:cNvPr id="163" name="CaixaDeTexto 162"/>
-          <p:cNvSpPr txBox="1"/>
-          <p:nvPr/>
-        </p:nvSpPr>
-        <p:spPr>
-          <a:xfrm>
-            <a:off x="4901364" y="4356138"/>
-            <a:ext cx="5341700" cy="523220"/>
-          </a:xfrm>
-          <a:prstGeom prst="rect">
-            <a:avLst/>
-          </a:prstGeom>
-          <a:noFill/>
-        </p:spPr>
-        <p:txBody>
-          <a:bodyPr wrap="square" rtlCol="0">
-            <a:spAutoFit/>
-          </a:bodyPr>
-          <a:lstStyle/>
-          <a:p>
-            <a:pPr algn="ctr"/>
-            <a:r>
-              <a:rPr lang="pt-BR" sz="2800" dirty="0">
-                <a:solidFill>
-                  <a:schemeClr val="tx1">
-                    <a:lumMod val="75000"/>
-                    <a:lumOff val="25000"/>
-                  </a:schemeClr>
-                </a:solidFill>
-                <a:latin typeface="Open Sans 1" panose="020B0604020202020204" charset="0"/>
-                <a:ea typeface="Open Sans 1" panose="020B0604020202020204" charset="0"/>
-                <a:cs typeface="Open Sans 1" panose="020B0604020202020204" charset="0"/>
-              </a:rPr>
-              <a:t>Cadastro da maquina</a:t>
-            </a:r>
-          </a:p>
-        </p:txBody>
-      </p:sp>
-      <p:sp>
-        <p:nvSpPr>
-          <p:cNvPr id="164" name="CaixaDeTexto 163"/>
-          <p:cNvSpPr txBox="1"/>
-          <p:nvPr/>
-        </p:nvSpPr>
-        <p:spPr>
-          <a:xfrm>
-            <a:off x="10465850" y="4378999"/>
+            <a:off x="10472603" y="6817399"/>
             <a:ext cx="2981511" cy="523220"/>
           </a:xfrm>
           <a:prstGeom prst="rect">
@@ -8387,13 +9227,13 @@
       </p:sp>
       <p:sp>
         <p:nvSpPr>
-          <p:cNvPr id="165" name="CaixaDeTexto 164"/>
+          <p:cNvPr id="189" name="CaixaDeTexto 188"/>
           <p:cNvSpPr txBox="1"/>
           <p:nvPr/>
         </p:nvSpPr>
         <p:spPr>
           <a:xfrm>
-            <a:off x="13651045" y="4356138"/>
+            <a:off x="13657798" y="6794538"/>
             <a:ext cx="2272111" cy="523220"/>
           </a:xfrm>
           <a:prstGeom prst="rect">
@@ -8420,20 +9260,20 @@
                 <a:ea typeface="Open Sans 1" panose="020B0604020202020204" charset="0"/>
                 <a:cs typeface="Open Sans 1" panose="020B0604020202020204" charset="0"/>
               </a:rPr>
-              <a:t>Grande</a:t>
-            </a:r>
-          </a:p>
-        </p:txBody>
-      </p:sp>
-      <p:sp>
-        <p:nvSpPr>
-          <p:cNvPr id="166" name="CaixaDeTexto 165"/>
+              <a:t>8</a:t>
+            </a:r>
+          </a:p>
+        </p:txBody>
+      </p:sp>
+      <p:sp>
+        <p:nvSpPr>
+          <p:cNvPr id="190" name="CaixaDeTexto 189"/>
           <p:cNvSpPr txBox="1"/>
           <p:nvPr/>
         </p:nvSpPr>
         <p:spPr>
           <a:xfrm>
-            <a:off x="16124622" y="4378999"/>
+            <a:off x="16131375" y="6817399"/>
             <a:ext cx="1919054" cy="523220"/>
           </a:xfrm>
           <a:prstGeom prst="rect">
@@ -8467,14 +9307,14 @@
       </p:sp>
       <p:sp>
         <p:nvSpPr>
-          <p:cNvPr id="167" name="CaixaDeTexto 166"/>
+          <p:cNvPr id="193" name="CaixaDeTexto 192"/>
           <p:cNvSpPr txBox="1"/>
           <p:nvPr/>
         </p:nvSpPr>
         <p:spPr>
           <a:xfrm>
-            <a:off x="228600" y="5001280"/>
-            <a:ext cx="660197" cy="523220"/>
+            <a:off x="4403507" y="7416819"/>
+            <a:ext cx="5846310" cy="646331"/>
           </a:xfrm>
           <a:prstGeom prst="rect">
             <a:avLst/>
@@ -8489,7 +9329,7 @@
           <a:p>
             <a:pPr algn="ctr"/>
             <a:r>
-              <a:rPr lang="pt-BR" sz="2800" dirty="0">
+              <a:rPr lang="pt-BR" dirty="0">
                 <a:solidFill>
                   <a:schemeClr val="tx1">
                     <a:lumMod val="75000"/>
@@ -8500,100 +9340,20 @@
                 <a:ea typeface="Open Sans 1" panose="020B0604020202020204" charset="0"/>
                 <a:cs typeface="Open Sans 1" panose="020B0604020202020204" charset="0"/>
               </a:rPr>
-              <a:t>01</a:t>
-            </a:r>
-          </a:p>
-        </p:txBody>
-      </p:sp>
-      <p:sp>
-        <p:nvSpPr>
-          <p:cNvPr id="168" name="CaixaDeTexto 167"/>
+              <a:t>A aplicação web deve emitir relatórios com a quantidade de horas que o computador ficou ativo</a:t>
+            </a:r>
+          </a:p>
+        </p:txBody>
+      </p:sp>
+      <p:sp>
+        <p:nvSpPr>
+          <p:cNvPr id="194" name="CaixaDeTexto 193"/>
           <p:cNvSpPr txBox="1"/>
           <p:nvPr/>
         </p:nvSpPr>
         <p:spPr>
           <a:xfrm>
-            <a:off x="1066800" y="5001280"/>
-            <a:ext cx="3648629" cy="523220"/>
-          </a:xfrm>
-          <a:prstGeom prst="rect">
-            <a:avLst/>
-          </a:prstGeom>
-          <a:noFill/>
-        </p:spPr>
-        <p:txBody>
-          <a:bodyPr wrap="square" rtlCol="0">
-            <a:spAutoFit/>
-          </a:bodyPr>
-          <a:lstStyle/>
-          <a:p>
-            <a:pPr algn="ctr"/>
-            <a:r>
-              <a:rPr lang="pt-BR" sz="2800" dirty="0">
-                <a:solidFill>
-                  <a:schemeClr val="tx1">
-                    <a:lumMod val="75000"/>
-                    <a:lumOff val="25000"/>
-                  </a:schemeClr>
-                </a:solidFill>
-                <a:latin typeface="Open Sans 1" panose="020B0604020202020204" charset="0"/>
-                <a:ea typeface="Open Sans 1" panose="020B0604020202020204" charset="0"/>
-                <a:cs typeface="Open Sans 1" panose="020B0604020202020204" charset="0"/>
-              </a:rPr>
-              <a:t>US#01&lt;Cadastro&gt;</a:t>
-            </a:r>
-          </a:p>
-        </p:txBody>
-      </p:sp>
-      <p:sp>
-        <p:nvSpPr>
-          <p:cNvPr id="169" name="CaixaDeTexto 168"/>
-          <p:cNvSpPr txBox="1"/>
-          <p:nvPr/>
-        </p:nvSpPr>
-        <p:spPr>
-          <a:xfrm>
-            <a:off x="4901364" y="4978419"/>
-            <a:ext cx="5341700" cy="523220"/>
-          </a:xfrm>
-          <a:prstGeom prst="rect">
-            <a:avLst/>
-          </a:prstGeom>
-          <a:noFill/>
-        </p:spPr>
-        <p:txBody>
-          <a:bodyPr wrap="square" rtlCol="0">
-            <a:spAutoFit/>
-          </a:bodyPr>
-          <a:lstStyle/>
-          <a:p>
-            <a:pPr algn="ctr"/>
-            <a:r>
-              <a:rPr lang="pt-BR" sz="2800" dirty="0">
-                <a:solidFill>
-                  <a:schemeClr val="tx1">
-                    <a:lumMod val="75000"/>
-                    <a:lumOff val="25000"/>
-                  </a:schemeClr>
-                </a:solidFill>
-                <a:latin typeface="Open Sans 1" panose="020B0604020202020204" charset="0"/>
-                <a:ea typeface="Open Sans 1" panose="020B0604020202020204" charset="0"/>
-                <a:cs typeface="Open Sans 1" panose="020B0604020202020204" charset="0"/>
-              </a:rPr>
-              <a:t>Cadastro da maquina</a:t>
-            </a:r>
-          </a:p>
-        </p:txBody>
-      </p:sp>
-      <p:sp>
-        <p:nvSpPr>
-          <p:cNvPr id="170" name="CaixaDeTexto 169"/>
-          <p:cNvSpPr txBox="1"/>
-          <p:nvPr/>
-        </p:nvSpPr>
-        <p:spPr>
-          <a:xfrm>
-            <a:off x="10465850" y="5001280"/>
+            <a:off x="10472603" y="7439680"/>
             <a:ext cx="2981511" cy="523220"/>
           </a:xfrm>
           <a:prstGeom prst="rect">
@@ -8627,13 +9387,13 @@
       </p:sp>
       <p:sp>
         <p:nvSpPr>
-          <p:cNvPr id="171" name="CaixaDeTexto 170"/>
+          <p:cNvPr id="195" name="CaixaDeTexto 194"/>
           <p:cNvSpPr txBox="1"/>
           <p:nvPr/>
         </p:nvSpPr>
         <p:spPr>
           <a:xfrm>
-            <a:off x="13651045" y="4978419"/>
+            <a:off x="13657798" y="7416819"/>
             <a:ext cx="2272111" cy="523220"/>
           </a:xfrm>
           <a:prstGeom prst="rect">
@@ -8660,20 +9420,20 @@
                 <a:ea typeface="Open Sans 1" panose="020B0604020202020204" charset="0"/>
                 <a:cs typeface="Open Sans 1" panose="020B0604020202020204" charset="0"/>
               </a:rPr>
-              <a:t>Grande</a:t>
-            </a:r>
-          </a:p>
-        </p:txBody>
-      </p:sp>
-      <p:sp>
-        <p:nvSpPr>
-          <p:cNvPr id="172" name="CaixaDeTexto 171"/>
+              <a:t>13</a:t>
+            </a:r>
+          </a:p>
+        </p:txBody>
+      </p:sp>
+      <p:sp>
+        <p:nvSpPr>
+          <p:cNvPr id="196" name="CaixaDeTexto 195"/>
           <p:cNvSpPr txBox="1"/>
           <p:nvPr/>
         </p:nvSpPr>
         <p:spPr>
           <a:xfrm>
-            <a:off x="16124622" y="5001280"/>
+            <a:off x="16131375" y="7439680"/>
             <a:ext cx="1919054" cy="523220"/>
           </a:xfrm>
           <a:prstGeom prst="rect">
@@ -8707,13 +9467,19 @@
       </p:sp>
       <p:sp>
         <p:nvSpPr>
-          <p:cNvPr id="173" name="CaixaDeTexto 172"/>
+          <p:cNvPr id="70" name="CaixaDeTexto 69">
+            <a:extLst>
+              <a:ext uri="{FF2B5EF4-FFF2-40B4-BE49-F238E27FC236}">
+                <a16:creationId xmlns:a16="http://schemas.microsoft.com/office/drawing/2014/main" id="{61CDB524-B6EA-42A1-9CD9-AE9973F38CC7}"/>
+              </a:ext>
+            </a:extLst>
+          </p:cNvPr>
           <p:cNvSpPr txBox="1"/>
           <p:nvPr/>
         </p:nvSpPr>
         <p:spPr>
           <a:xfrm>
-            <a:off x="244324" y="5610880"/>
+            <a:off x="235353" y="6817399"/>
             <a:ext cx="660197" cy="523220"/>
           </a:xfrm>
           <a:prstGeom prst="rect">
@@ -8740,21 +9506,27 @@
                 <a:ea typeface="Open Sans 1" panose="020B0604020202020204" charset="0"/>
                 <a:cs typeface="Open Sans 1" panose="020B0604020202020204" charset="0"/>
               </a:rPr>
-              <a:t>01</a:t>
-            </a:r>
-          </a:p>
-        </p:txBody>
-      </p:sp>
-      <p:sp>
-        <p:nvSpPr>
-          <p:cNvPr id="174" name="CaixaDeTexto 173"/>
+              <a:t>07</a:t>
+            </a:r>
+          </a:p>
+        </p:txBody>
+      </p:sp>
+      <p:sp>
+        <p:nvSpPr>
+          <p:cNvPr id="71" name="CaixaDeTexto 70">
+            <a:extLst>
+              <a:ext uri="{FF2B5EF4-FFF2-40B4-BE49-F238E27FC236}">
+                <a16:creationId xmlns:a16="http://schemas.microsoft.com/office/drawing/2014/main" id="{294D5498-F61B-4B6F-AC37-893C7E3E8E5D}"/>
+              </a:ext>
+            </a:extLst>
+          </p:cNvPr>
           <p:cNvSpPr txBox="1"/>
           <p:nvPr/>
         </p:nvSpPr>
         <p:spPr>
           <a:xfrm>
-            <a:off x="1082524" y="5610880"/>
-            <a:ext cx="3648629" cy="523220"/>
+            <a:off x="235353" y="7439680"/>
+            <a:ext cx="660197" cy="523220"/>
           </a:xfrm>
           <a:prstGeom prst="rect">
             <a:avLst/>
@@ -8780,21 +9552,27 @@
                 <a:ea typeface="Open Sans 1" panose="020B0604020202020204" charset="0"/>
                 <a:cs typeface="Open Sans 1" panose="020B0604020202020204" charset="0"/>
               </a:rPr>
-              <a:t>US#01&lt;Cadastro&gt;</a:t>
-            </a:r>
-          </a:p>
-        </p:txBody>
-      </p:sp>
-      <p:sp>
-        <p:nvSpPr>
-          <p:cNvPr id="175" name="CaixaDeTexto 174"/>
+              <a:t>08</a:t>
+            </a:r>
+          </a:p>
+        </p:txBody>
+      </p:sp>
+      <p:sp>
+        <p:nvSpPr>
+          <p:cNvPr id="72" name="CaixaDeTexto 71">
+            <a:extLst>
+              <a:ext uri="{FF2B5EF4-FFF2-40B4-BE49-F238E27FC236}">
+                <a16:creationId xmlns:a16="http://schemas.microsoft.com/office/drawing/2014/main" id="{B60A4B64-8088-4F58-9EC5-A2138DAA4F05}"/>
+              </a:ext>
+            </a:extLst>
+          </p:cNvPr>
           <p:cNvSpPr txBox="1"/>
           <p:nvPr/>
         </p:nvSpPr>
         <p:spPr>
           <a:xfrm>
-            <a:off x="4917088" y="5588019"/>
-            <a:ext cx="5341700" cy="523220"/>
+            <a:off x="244324" y="8023918"/>
+            <a:ext cx="660197" cy="523220"/>
           </a:xfrm>
           <a:prstGeom prst="rect">
             <a:avLst/>
@@ -8820,20 +9598,118 @@
                 <a:ea typeface="Open Sans 1" panose="020B0604020202020204" charset="0"/>
                 <a:cs typeface="Open Sans 1" panose="020B0604020202020204" charset="0"/>
               </a:rPr>
-              <a:t>Cadastro da maquina</a:t>
-            </a:r>
-          </a:p>
-        </p:txBody>
-      </p:sp>
-      <p:sp>
-        <p:nvSpPr>
-          <p:cNvPr id="176" name="CaixaDeTexto 175"/>
+              <a:t>09</a:t>
+            </a:r>
+          </a:p>
+        </p:txBody>
+      </p:sp>
+      <p:sp>
+        <p:nvSpPr>
+          <p:cNvPr id="73" name="CaixaDeTexto 72">
+            <a:extLst>
+              <a:ext uri="{FF2B5EF4-FFF2-40B4-BE49-F238E27FC236}">
+                <a16:creationId xmlns:a16="http://schemas.microsoft.com/office/drawing/2014/main" id="{EABC6DF3-293B-44C4-95D4-04A64FF35665}"/>
+              </a:ext>
+            </a:extLst>
+          </p:cNvPr>
           <p:cNvSpPr txBox="1"/>
           <p:nvPr/>
         </p:nvSpPr>
         <p:spPr>
           <a:xfrm>
-            <a:off x="10481574" y="5610880"/>
+            <a:off x="244324" y="8646199"/>
+            <a:ext cx="660197" cy="523220"/>
+          </a:xfrm>
+          <a:prstGeom prst="rect">
+            <a:avLst/>
+          </a:prstGeom>
+          <a:noFill/>
+        </p:spPr>
+        <p:txBody>
+          <a:bodyPr wrap="square" rtlCol="0">
+            <a:spAutoFit/>
+          </a:bodyPr>
+          <a:lstStyle/>
+          <a:p>
+            <a:pPr algn="ctr"/>
+            <a:r>
+              <a:rPr lang="pt-BR" sz="2800" dirty="0">
+                <a:solidFill>
+                  <a:schemeClr val="tx1">
+                    <a:lumMod val="75000"/>
+                    <a:lumOff val="25000"/>
+                  </a:schemeClr>
+                </a:solidFill>
+                <a:latin typeface="Open Sans 1" panose="020B0604020202020204" charset="0"/>
+                <a:ea typeface="Open Sans 1" panose="020B0604020202020204" charset="0"/>
+                <a:cs typeface="Open Sans 1" panose="020B0604020202020204" charset="0"/>
+              </a:rPr>
+              <a:t>10</a:t>
+            </a:r>
+          </a:p>
+        </p:txBody>
+      </p:sp>
+      <p:sp>
+        <p:nvSpPr>
+          <p:cNvPr id="75" name="CaixaDeTexto 74">
+            <a:extLst>
+              <a:ext uri="{FF2B5EF4-FFF2-40B4-BE49-F238E27FC236}">
+                <a16:creationId xmlns:a16="http://schemas.microsoft.com/office/drawing/2014/main" id="{7B343F95-2A0F-4DB5-9344-335B47860267}"/>
+              </a:ext>
+            </a:extLst>
+          </p:cNvPr>
+          <p:cNvSpPr txBox="1"/>
+          <p:nvPr/>
+        </p:nvSpPr>
+        <p:spPr>
+          <a:xfrm>
+            <a:off x="4360033" y="8048413"/>
+            <a:ext cx="5898755" cy="707886"/>
+          </a:xfrm>
+          <a:prstGeom prst="rect">
+            <a:avLst/>
+          </a:prstGeom>
+          <a:noFill/>
+        </p:spPr>
+        <p:txBody>
+          <a:bodyPr wrap="square" rtlCol="0">
+            <a:spAutoFit/>
+          </a:bodyPr>
+          <a:lstStyle/>
+          <a:p>
+            <a:pPr algn="ctr"/>
+            <a:r>
+              <a:rPr lang="pt-BR" sz="2000" dirty="0">
+                <a:solidFill>
+                  <a:schemeClr val="tx1">
+                    <a:lumMod val="75000"/>
+                    <a:lumOff val="25000"/>
+                  </a:schemeClr>
+                </a:solidFill>
+                <a:latin typeface="Open Sans 1" panose="020B0604020202020204" charset="0"/>
+                <a:ea typeface="Open Sans 1" panose="020B0604020202020204" charset="0"/>
+                <a:cs typeface="Open Sans 1" panose="020B0604020202020204" charset="0"/>
+              </a:rPr>
+              <a:t>A aplicação web deve possuir um histórico com todas as ocorrências das máquinas</a:t>
+            </a:r>
+          </a:p>
+        </p:txBody>
+      </p:sp>
+      <p:sp>
+        <p:nvSpPr>
+          <p:cNvPr id="76" name="CaixaDeTexto 75">
+            <a:extLst>
+              <a:ext uri="{FF2B5EF4-FFF2-40B4-BE49-F238E27FC236}">
+                <a16:creationId xmlns:a16="http://schemas.microsoft.com/office/drawing/2014/main" id="{4E80DB3B-16E0-4A70-9076-ED20791E4671}"/>
+              </a:ext>
+            </a:extLst>
+          </p:cNvPr>
+          <p:cNvSpPr txBox="1"/>
+          <p:nvPr/>
+        </p:nvSpPr>
+        <p:spPr>
+          <a:xfrm>
+            <a:off x="10481574" y="8071275"/>
             <a:ext cx="2981511" cy="523220"/>
           </a:xfrm>
           <a:prstGeom prst="rect">
@@ -8867,13 +9743,19 @@
       </p:sp>
       <p:sp>
         <p:nvSpPr>
-          <p:cNvPr id="177" name="CaixaDeTexto 176"/>
+          <p:cNvPr id="77" name="CaixaDeTexto 76">
+            <a:extLst>
+              <a:ext uri="{FF2B5EF4-FFF2-40B4-BE49-F238E27FC236}">
+                <a16:creationId xmlns:a16="http://schemas.microsoft.com/office/drawing/2014/main" id="{C621C4C2-F912-4BDC-9405-01192F181734}"/>
+              </a:ext>
+            </a:extLst>
+          </p:cNvPr>
           <p:cNvSpPr txBox="1"/>
           <p:nvPr/>
         </p:nvSpPr>
         <p:spPr>
           <a:xfrm>
-            <a:off x="13666769" y="5588019"/>
+            <a:off x="13666769" y="8048414"/>
             <a:ext cx="2272111" cy="523220"/>
           </a:xfrm>
           <a:prstGeom prst="rect">
@@ -8900,20 +9782,26 @@
                 <a:ea typeface="Open Sans 1" panose="020B0604020202020204" charset="0"/>
                 <a:cs typeface="Open Sans 1" panose="020B0604020202020204" charset="0"/>
               </a:rPr>
-              <a:t>Grande</a:t>
-            </a:r>
-          </a:p>
-        </p:txBody>
-      </p:sp>
-      <p:sp>
-        <p:nvSpPr>
-          <p:cNvPr id="178" name="CaixaDeTexto 177"/>
+              <a:t>8</a:t>
+            </a:r>
+          </a:p>
+        </p:txBody>
+      </p:sp>
+      <p:sp>
+        <p:nvSpPr>
+          <p:cNvPr id="78" name="CaixaDeTexto 77">
+            <a:extLst>
+              <a:ext uri="{FF2B5EF4-FFF2-40B4-BE49-F238E27FC236}">
+                <a16:creationId xmlns:a16="http://schemas.microsoft.com/office/drawing/2014/main" id="{3E31BF00-9930-4672-AD52-A8C4577BF1BD}"/>
+              </a:ext>
+            </a:extLst>
+          </p:cNvPr>
           <p:cNvSpPr txBox="1"/>
           <p:nvPr/>
         </p:nvSpPr>
         <p:spPr>
           <a:xfrm>
-            <a:off x="16140346" y="5610880"/>
+            <a:off x="16140346" y="8071275"/>
             <a:ext cx="1919054" cy="523220"/>
           </a:xfrm>
           <a:prstGeom prst="rect">
@@ -8947,14 +9835,20 @@
       </p:sp>
       <p:sp>
         <p:nvSpPr>
-          <p:cNvPr id="179" name="CaixaDeTexto 178"/>
+          <p:cNvPr id="80" name="CaixaDeTexto 79">
+            <a:extLst>
+              <a:ext uri="{FF2B5EF4-FFF2-40B4-BE49-F238E27FC236}">
+                <a16:creationId xmlns:a16="http://schemas.microsoft.com/office/drawing/2014/main" id="{78E3A1C9-501B-4F4B-907D-0F0C4B1058AB}"/>
+              </a:ext>
+            </a:extLst>
+          </p:cNvPr>
           <p:cNvSpPr txBox="1"/>
           <p:nvPr/>
         </p:nvSpPr>
         <p:spPr>
           <a:xfrm>
-            <a:off x="244324" y="6233161"/>
-            <a:ext cx="660197" cy="523220"/>
+            <a:off x="4362250" y="8670694"/>
+            <a:ext cx="5896538" cy="707886"/>
           </a:xfrm>
           <a:prstGeom prst="rect">
             <a:avLst/>
@@ -8969,7 +9863,7 @@
           <a:p>
             <a:pPr algn="ctr"/>
             <a:r>
-              <a:rPr lang="pt-BR" sz="2800" dirty="0">
+              <a:rPr lang="pt-BR" sz="2000" dirty="0">
                 <a:solidFill>
                   <a:schemeClr val="tx1">
                     <a:lumMod val="75000"/>
@@ -8980,100 +9874,26 @@
                 <a:ea typeface="Open Sans 1" panose="020B0604020202020204" charset="0"/>
                 <a:cs typeface="Open Sans 1" panose="020B0604020202020204" charset="0"/>
               </a:rPr>
-              <a:t>01</a:t>
-            </a:r>
-          </a:p>
-        </p:txBody>
-      </p:sp>
-      <p:sp>
-        <p:nvSpPr>
-          <p:cNvPr id="180" name="CaixaDeTexto 179"/>
+              <a:t>A aplicação web deve permitir a visualização de quantos computadores precisam de reparo</a:t>
+            </a:r>
+          </a:p>
+        </p:txBody>
+      </p:sp>
+      <p:sp>
+        <p:nvSpPr>
+          <p:cNvPr id="81" name="CaixaDeTexto 80">
+            <a:extLst>
+              <a:ext uri="{FF2B5EF4-FFF2-40B4-BE49-F238E27FC236}">
+                <a16:creationId xmlns:a16="http://schemas.microsoft.com/office/drawing/2014/main" id="{FBF0A404-643F-489E-9618-D120EBBB95C0}"/>
+              </a:ext>
+            </a:extLst>
+          </p:cNvPr>
           <p:cNvSpPr txBox="1"/>
           <p:nvPr/>
         </p:nvSpPr>
         <p:spPr>
           <a:xfrm>
-            <a:off x="1082524" y="6233161"/>
-            <a:ext cx="3648629" cy="523220"/>
-          </a:xfrm>
-          <a:prstGeom prst="rect">
-            <a:avLst/>
-          </a:prstGeom>
-          <a:noFill/>
-        </p:spPr>
-        <p:txBody>
-          <a:bodyPr wrap="square" rtlCol="0">
-            <a:spAutoFit/>
-          </a:bodyPr>
-          <a:lstStyle/>
-          <a:p>
-            <a:pPr algn="ctr"/>
-            <a:r>
-              <a:rPr lang="pt-BR" sz="2800" dirty="0">
-                <a:solidFill>
-                  <a:schemeClr val="tx1">
-                    <a:lumMod val="75000"/>
-                    <a:lumOff val="25000"/>
-                  </a:schemeClr>
-                </a:solidFill>
-                <a:latin typeface="Open Sans 1" panose="020B0604020202020204" charset="0"/>
-                <a:ea typeface="Open Sans 1" panose="020B0604020202020204" charset="0"/>
-                <a:cs typeface="Open Sans 1" panose="020B0604020202020204" charset="0"/>
-              </a:rPr>
-              <a:t>US#01&lt;Cadastro&gt;</a:t>
-            </a:r>
-          </a:p>
-        </p:txBody>
-      </p:sp>
-      <p:sp>
-        <p:nvSpPr>
-          <p:cNvPr id="181" name="CaixaDeTexto 180"/>
-          <p:cNvSpPr txBox="1"/>
-          <p:nvPr/>
-        </p:nvSpPr>
-        <p:spPr>
-          <a:xfrm>
-            <a:off x="4917088" y="6210300"/>
-            <a:ext cx="5341700" cy="523220"/>
-          </a:xfrm>
-          <a:prstGeom prst="rect">
-            <a:avLst/>
-          </a:prstGeom>
-          <a:noFill/>
-        </p:spPr>
-        <p:txBody>
-          <a:bodyPr wrap="square" rtlCol="0">
-            <a:spAutoFit/>
-          </a:bodyPr>
-          <a:lstStyle/>
-          <a:p>
-            <a:pPr algn="ctr"/>
-            <a:r>
-              <a:rPr lang="pt-BR" sz="2800" dirty="0">
-                <a:solidFill>
-                  <a:schemeClr val="tx1">
-                    <a:lumMod val="75000"/>
-                    <a:lumOff val="25000"/>
-                  </a:schemeClr>
-                </a:solidFill>
-                <a:latin typeface="Open Sans 1" panose="020B0604020202020204" charset="0"/>
-                <a:ea typeface="Open Sans 1" panose="020B0604020202020204" charset="0"/>
-                <a:cs typeface="Open Sans 1" panose="020B0604020202020204" charset="0"/>
-              </a:rPr>
-              <a:t>Cadastro da maquina</a:t>
-            </a:r>
-          </a:p>
-        </p:txBody>
-      </p:sp>
-      <p:sp>
-        <p:nvSpPr>
-          <p:cNvPr id="182" name="CaixaDeTexto 181"/>
-          <p:cNvSpPr txBox="1"/>
-          <p:nvPr/>
-        </p:nvSpPr>
-        <p:spPr>
-          <a:xfrm>
-            <a:off x="10481574" y="6233161"/>
+            <a:off x="10481574" y="8693556"/>
             <a:ext cx="2981511" cy="523220"/>
           </a:xfrm>
           <a:prstGeom prst="rect">
@@ -9107,13 +9927,19 @@
       </p:sp>
       <p:sp>
         <p:nvSpPr>
-          <p:cNvPr id="183" name="CaixaDeTexto 182"/>
+          <p:cNvPr id="82" name="CaixaDeTexto 81">
+            <a:extLst>
+              <a:ext uri="{FF2B5EF4-FFF2-40B4-BE49-F238E27FC236}">
+                <a16:creationId xmlns:a16="http://schemas.microsoft.com/office/drawing/2014/main" id="{B6F5F467-D399-4448-8941-AA0261284B2D}"/>
+              </a:ext>
+            </a:extLst>
+          </p:cNvPr>
           <p:cNvSpPr txBox="1"/>
           <p:nvPr/>
         </p:nvSpPr>
         <p:spPr>
           <a:xfrm>
-            <a:off x="13666769" y="6210300"/>
+            <a:off x="13666769" y="8670695"/>
             <a:ext cx="2272111" cy="523220"/>
           </a:xfrm>
           <a:prstGeom prst="rect">
@@ -9140,20 +9966,26 @@
                 <a:ea typeface="Open Sans 1" panose="020B0604020202020204" charset="0"/>
                 <a:cs typeface="Open Sans 1" panose="020B0604020202020204" charset="0"/>
               </a:rPr>
-              <a:t>Grande</a:t>
-            </a:r>
-          </a:p>
-        </p:txBody>
-      </p:sp>
-      <p:sp>
-        <p:nvSpPr>
-          <p:cNvPr id="184" name="CaixaDeTexto 183"/>
+              <a:t>13</a:t>
+            </a:r>
+          </a:p>
+        </p:txBody>
+      </p:sp>
+      <p:sp>
+        <p:nvSpPr>
+          <p:cNvPr id="83" name="CaixaDeTexto 82">
+            <a:extLst>
+              <a:ext uri="{FF2B5EF4-FFF2-40B4-BE49-F238E27FC236}">
+                <a16:creationId xmlns:a16="http://schemas.microsoft.com/office/drawing/2014/main" id="{ACBDDA03-07F4-4315-9F3C-CD8B8C29838C}"/>
+              </a:ext>
+            </a:extLst>
+          </p:cNvPr>
           <p:cNvSpPr txBox="1"/>
           <p:nvPr/>
         </p:nvSpPr>
         <p:spPr>
           <a:xfrm>
-            <a:off x="16140346" y="6233161"/>
+            <a:off x="16140346" y="8693556"/>
             <a:ext cx="1919054" cy="523220"/>
           </a:xfrm>
           <a:prstGeom prst="rect">
@@ -9187,14 +10019,20 @@
       </p:sp>
       <p:sp>
         <p:nvSpPr>
-          <p:cNvPr id="185" name="CaixaDeTexto 184"/>
+          <p:cNvPr id="84" name="CaixaDeTexto 83">
+            <a:extLst>
+              <a:ext uri="{FF2B5EF4-FFF2-40B4-BE49-F238E27FC236}">
+                <a16:creationId xmlns:a16="http://schemas.microsoft.com/office/drawing/2014/main" id="{A4B3532D-5108-4C15-A93B-4F0AC877DBC3}"/>
+              </a:ext>
+            </a:extLst>
+          </p:cNvPr>
           <p:cNvSpPr txBox="1"/>
           <p:nvPr/>
         </p:nvSpPr>
         <p:spPr>
           <a:xfrm>
-            <a:off x="235353" y="6817399"/>
-            <a:ext cx="660197" cy="523220"/>
+            <a:off x="1089029" y="6233161"/>
+            <a:ext cx="3115230" cy="523220"/>
           </a:xfrm>
           <a:prstGeom prst="rect">
             <a:avLst/>
@@ -9220,21 +10058,27 @@
                 <a:ea typeface="Open Sans 1" panose="020B0604020202020204" charset="0"/>
                 <a:cs typeface="Open Sans 1" panose="020B0604020202020204" charset="0"/>
               </a:rPr>
-              <a:t>01</a:t>
-            </a:r>
-          </a:p>
-        </p:txBody>
-      </p:sp>
-      <p:sp>
-        <p:nvSpPr>
-          <p:cNvPr id="186" name="CaixaDeTexto 185"/>
+              <a:t>Site</a:t>
+            </a:r>
+          </a:p>
+        </p:txBody>
+      </p:sp>
+      <p:sp>
+        <p:nvSpPr>
+          <p:cNvPr id="85" name="CaixaDeTexto 84">
+            <a:extLst>
+              <a:ext uri="{FF2B5EF4-FFF2-40B4-BE49-F238E27FC236}">
+                <a16:creationId xmlns:a16="http://schemas.microsoft.com/office/drawing/2014/main" id="{7C0BB027-C53E-4A42-AB35-A92411168CC4}"/>
+              </a:ext>
+            </a:extLst>
+          </p:cNvPr>
           <p:cNvSpPr txBox="1"/>
           <p:nvPr/>
         </p:nvSpPr>
         <p:spPr>
           <a:xfrm>
-            <a:off x="1073553" y="6817399"/>
-            <a:ext cx="3648629" cy="523220"/>
+            <a:off x="1075771" y="6817399"/>
+            <a:ext cx="3115229" cy="523220"/>
           </a:xfrm>
           <a:prstGeom prst="rect">
             <a:avLst/>
@@ -9260,21 +10104,27 @@
                 <a:ea typeface="Open Sans 1" panose="020B0604020202020204" charset="0"/>
                 <a:cs typeface="Open Sans 1" panose="020B0604020202020204" charset="0"/>
               </a:rPr>
-              <a:t>US#01&lt;Cadastro&gt;</a:t>
-            </a:r>
-          </a:p>
-        </p:txBody>
-      </p:sp>
-      <p:sp>
-        <p:nvSpPr>
-          <p:cNvPr id="187" name="CaixaDeTexto 186"/>
+              <a:t>Site</a:t>
+            </a:r>
+          </a:p>
+        </p:txBody>
+      </p:sp>
+      <p:sp>
+        <p:nvSpPr>
+          <p:cNvPr id="86" name="CaixaDeTexto 85">
+            <a:extLst>
+              <a:ext uri="{FF2B5EF4-FFF2-40B4-BE49-F238E27FC236}">
+                <a16:creationId xmlns:a16="http://schemas.microsoft.com/office/drawing/2014/main" id="{37807A88-01B2-4503-A548-AE6A922AFA21}"/>
+              </a:ext>
+            </a:extLst>
+          </p:cNvPr>
           <p:cNvSpPr txBox="1"/>
           <p:nvPr/>
         </p:nvSpPr>
         <p:spPr>
           <a:xfrm>
-            <a:off x="4908117" y="6794538"/>
-            <a:ext cx="5341700" cy="523220"/>
+            <a:off x="1066801" y="7439680"/>
+            <a:ext cx="3115229" cy="523220"/>
           </a:xfrm>
           <a:prstGeom prst="rect">
             <a:avLst/>
@@ -9300,21 +10150,27 @@
                 <a:ea typeface="Open Sans 1" panose="020B0604020202020204" charset="0"/>
                 <a:cs typeface="Open Sans 1" panose="020B0604020202020204" charset="0"/>
               </a:rPr>
-              <a:t>Cadastro da maquina</a:t>
-            </a:r>
-          </a:p>
-        </p:txBody>
-      </p:sp>
-      <p:sp>
-        <p:nvSpPr>
-          <p:cNvPr id="188" name="CaixaDeTexto 187"/>
+              <a:t>Site</a:t>
+            </a:r>
+          </a:p>
+        </p:txBody>
+      </p:sp>
+      <p:sp>
+        <p:nvSpPr>
+          <p:cNvPr id="87" name="CaixaDeTexto 86">
+            <a:extLst>
+              <a:ext uri="{FF2B5EF4-FFF2-40B4-BE49-F238E27FC236}">
+                <a16:creationId xmlns:a16="http://schemas.microsoft.com/office/drawing/2014/main" id="{1A854D6A-DC85-4D02-9818-B80C2C5DA018}"/>
+              </a:ext>
+            </a:extLst>
+          </p:cNvPr>
           <p:cNvSpPr txBox="1"/>
           <p:nvPr/>
         </p:nvSpPr>
         <p:spPr>
           <a:xfrm>
-            <a:off x="10472603" y="6817399"/>
-            <a:ext cx="2981511" cy="523220"/>
+            <a:off x="1066801" y="8049280"/>
+            <a:ext cx="3130952" cy="523220"/>
           </a:xfrm>
           <a:prstGeom prst="rect">
             <a:avLst/>
@@ -9340,21 +10196,27 @@
                 <a:ea typeface="Open Sans 1" panose="020B0604020202020204" charset="0"/>
                 <a:cs typeface="Open Sans 1" panose="020B0604020202020204" charset="0"/>
               </a:rPr>
-              <a:t>Essencial</a:t>
-            </a:r>
-          </a:p>
-        </p:txBody>
-      </p:sp>
-      <p:sp>
-        <p:nvSpPr>
-          <p:cNvPr id="189" name="CaixaDeTexto 188"/>
+              <a:t>Site</a:t>
+            </a:r>
+          </a:p>
+        </p:txBody>
+      </p:sp>
+      <p:sp>
+        <p:nvSpPr>
+          <p:cNvPr id="88" name="CaixaDeTexto 87">
+            <a:extLst>
+              <a:ext uri="{FF2B5EF4-FFF2-40B4-BE49-F238E27FC236}">
+                <a16:creationId xmlns:a16="http://schemas.microsoft.com/office/drawing/2014/main" id="{B8B34107-D7F1-42F4-B391-AB448795F7FD}"/>
+              </a:ext>
+            </a:extLst>
+          </p:cNvPr>
           <p:cNvSpPr txBox="1"/>
           <p:nvPr/>
         </p:nvSpPr>
         <p:spPr>
           <a:xfrm>
-            <a:off x="13657798" y="6794538"/>
-            <a:ext cx="2272111" cy="523220"/>
+            <a:off x="1075772" y="8658880"/>
+            <a:ext cx="3128488" cy="523220"/>
           </a:xfrm>
           <a:prstGeom prst="rect">
             <a:avLst/>
@@ -9380,287 +10242,7 @@
                 <a:ea typeface="Open Sans 1" panose="020B0604020202020204" charset="0"/>
                 <a:cs typeface="Open Sans 1" panose="020B0604020202020204" charset="0"/>
               </a:rPr>
-              <a:t>Grande</a:t>
-            </a:r>
-          </a:p>
-        </p:txBody>
-      </p:sp>
-      <p:sp>
-        <p:nvSpPr>
-          <p:cNvPr id="190" name="CaixaDeTexto 189"/>
-          <p:cNvSpPr txBox="1"/>
-          <p:nvPr/>
-        </p:nvSpPr>
-        <p:spPr>
-          <a:xfrm>
-            <a:off x="16131375" y="6817399"/>
-            <a:ext cx="1919054" cy="523220"/>
-          </a:xfrm>
-          <a:prstGeom prst="rect">
-            <a:avLst/>
-          </a:prstGeom>
-          <a:noFill/>
-        </p:spPr>
-        <p:txBody>
-          <a:bodyPr wrap="square" rtlCol="0">
-            <a:spAutoFit/>
-          </a:bodyPr>
-          <a:lstStyle/>
-          <a:p>
-            <a:pPr algn="ctr"/>
-            <a:r>
-              <a:rPr lang="pt-BR" sz="2800" dirty="0">
-                <a:solidFill>
-                  <a:schemeClr val="tx1">
-                    <a:lumMod val="75000"/>
-                    <a:lumOff val="25000"/>
-                  </a:schemeClr>
-                </a:solidFill>
-                <a:latin typeface="Open Sans 1" panose="020B0604020202020204" charset="0"/>
-                <a:ea typeface="Open Sans 1" panose="020B0604020202020204" charset="0"/>
-                <a:cs typeface="Open Sans 1" panose="020B0604020202020204" charset="0"/>
-              </a:rPr>
-              <a:t>Funcional</a:t>
-            </a:r>
-          </a:p>
-        </p:txBody>
-      </p:sp>
-      <p:sp>
-        <p:nvSpPr>
-          <p:cNvPr id="191" name="CaixaDeTexto 190"/>
-          <p:cNvSpPr txBox="1"/>
-          <p:nvPr/>
-        </p:nvSpPr>
-        <p:spPr>
-          <a:xfrm>
-            <a:off x="235353" y="7439680"/>
-            <a:ext cx="660197" cy="523220"/>
-          </a:xfrm>
-          <a:prstGeom prst="rect">
-            <a:avLst/>
-          </a:prstGeom>
-          <a:noFill/>
-        </p:spPr>
-        <p:txBody>
-          <a:bodyPr wrap="square" rtlCol="0">
-            <a:spAutoFit/>
-          </a:bodyPr>
-          <a:lstStyle/>
-          <a:p>
-            <a:pPr algn="ctr"/>
-            <a:r>
-              <a:rPr lang="pt-BR" sz="2800" dirty="0">
-                <a:solidFill>
-                  <a:schemeClr val="tx1">
-                    <a:lumMod val="75000"/>
-                    <a:lumOff val="25000"/>
-                  </a:schemeClr>
-                </a:solidFill>
-                <a:latin typeface="Open Sans 1" panose="020B0604020202020204" charset="0"/>
-                <a:ea typeface="Open Sans 1" panose="020B0604020202020204" charset="0"/>
-                <a:cs typeface="Open Sans 1" panose="020B0604020202020204" charset="0"/>
-              </a:rPr>
-              <a:t>01</a:t>
-            </a:r>
-          </a:p>
-        </p:txBody>
-      </p:sp>
-      <p:sp>
-        <p:nvSpPr>
-          <p:cNvPr id="192" name="CaixaDeTexto 191"/>
-          <p:cNvSpPr txBox="1"/>
-          <p:nvPr/>
-        </p:nvSpPr>
-        <p:spPr>
-          <a:xfrm>
-            <a:off x="1073553" y="7439680"/>
-            <a:ext cx="3648629" cy="523220"/>
-          </a:xfrm>
-          <a:prstGeom prst="rect">
-            <a:avLst/>
-          </a:prstGeom>
-          <a:noFill/>
-        </p:spPr>
-        <p:txBody>
-          <a:bodyPr wrap="square" rtlCol="0">
-            <a:spAutoFit/>
-          </a:bodyPr>
-          <a:lstStyle/>
-          <a:p>
-            <a:pPr algn="ctr"/>
-            <a:r>
-              <a:rPr lang="pt-BR" sz="2800" dirty="0">
-                <a:solidFill>
-                  <a:schemeClr val="tx1">
-                    <a:lumMod val="75000"/>
-                    <a:lumOff val="25000"/>
-                  </a:schemeClr>
-                </a:solidFill>
-                <a:latin typeface="Open Sans 1" panose="020B0604020202020204" charset="0"/>
-                <a:ea typeface="Open Sans 1" panose="020B0604020202020204" charset="0"/>
-                <a:cs typeface="Open Sans 1" panose="020B0604020202020204" charset="0"/>
-              </a:rPr>
-              <a:t>US#01&lt;Cadastro&gt;</a:t>
-            </a:r>
-          </a:p>
-        </p:txBody>
-      </p:sp>
-      <p:sp>
-        <p:nvSpPr>
-          <p:cNvPr id="193" name="CaixaDeTexto 192"/>
-          <p:cNvSpPr txBox="1"/>
-          <p:nvPr/>
-        </p:nvSpPr>
-        <p:spPr>
-          <a:xfrm>
-            <a:off x="4908117" y="7416819"/>
-            <a:ext cx="5341700" cy="523220"/>
-          </a:xfrm>
-          <a:prstGeom prst="rect">
-            <a:avLst/>
-          </a:prstGeom>
-          <a:noFill/>
-        </p:spPr>
-        <p:txBody>
-          <a:bodyPr wrap="square" rtlCol="0">
-            <a:spAutoFit/>
-          </a:bodyPr>
-          <a:lstStyle/>
-          <a:p>
-            <a:pPr algn="ctr"/>
-            <a:r>
-              <a:rPr lang="pt-BR" sz="2800" dirty="0">
-                <a:solidFill>
-                  <a:schemeClr val="tx1">
-                    <a:lumMod val="75000"/>
-                    <a:lumOff val="25000"/>
-                  </a:schemeClr>
-                </a:solidFill>
-                <a:latin typeface="Open Sans 1" panose="020B0604020202020204" charset="0"/>
-                <a:ea typeface="Open Sans 1" panose="020B0604020202020204" charset="0"/>
-                <a:cs typeface="Open Sans 1" panose="020B0604020202020204" charset="0"/>
-              </a:rPr>
-              <a:t>Cadastro da maquina</a:t>
-            </a:r>
-          </a:p>
-        </p:txBody>
-      </p:sp>
-      <p:sp>
-        <p:nvSpPr>
-          <p:cNvPr id="194" name="CaixaDeTexto 193"/>
-          <p:cNvSpPr txBox="1"/>
-          <p:nvPr/>
-        </p:nvSpPr>
-        <p:spPr>
-          <a:xfrm>
-            <a:off x="10472603" y="7439680"/>
-            <a:ext cx="2981511" cy="523220"/>
-          </a:xfrm>
-          <a:prstGeom prst="rect">
-            <a:avLst/>
-          </a:prstGeom>
-          <a:noFill/>
-        </p:spPr>
-        <p:txBody>
-          <a:bodyPr wrap="square" rtlCol="0">
-            <a:spAutoFit/>
-          </a:bodyPr>
-          <a:lstStyle/>
-          <a:p>
-            <a:pPr algn="ctr"/>
-            <a:r>
-              <a:rPr lang="pt-BR" sz="2800" dirty="0">
-                <a:solidFill>
-                  <a:schemeClr val="tx1">
-                    <a:lumMod val="75000"/>
-                    <a:lumOff val="25000"/>
-                  </a:schemeClr>
-                </a:solidFill>
-                <a:latin typeface="Open Sans 1" panose="020B0604020202020204" charset="0"/>
-                <a:ea typeface="Open Sans 1" panose="020B0604020202020204" charset="0"/>
-                <a:cs typeface="Open Sans 1" panose="020B0604020202020204" charset="0"/>
-              </a:rPr>
-              <a:t>Essencial</a:t>
-            </a:r>
-          </a:p>
-        </p:txBody>
-      </p:sp>
-      <p:sp>
-        <p:nvSpPr>
-          <p:cNvPr id="195" name="CaixaDeTexto 194"/>
-          <p:cNvSpPr txBox="1"/>
-          <p:nvPr/>
-        </p:nvSpPr>
-        <p:spPr>
-          <a:xfrm>
-            <a:off x="13657798" y="7416819"/>
-            <a:ext cx="2272111" cy="523220"/>
-          </a:xfrm>
-          <a:prstGeom prst="rect">
-            <a:avLst/>
-          </a:prstGeom>
-          <a:noFill/>
-        </p:spPr>
-        <p:txBody>
-          <a:bodyPr wrap="square" rtlCol="0">
-            <a:spAutoFit/>
-          </a:bodyPr>
-          <a:lstStyle/>
-          <a:p>
-            <a:pPr algn="ctr"/>
-            <a:r>
-              <a:rPr lang="pt-BR" sz="2800" dirty="0">
-                <a:solidFill>
-                  <a:schemeClr val="tx1">
-                    <a:lumMod val="75000"/>
-                    <a:lumOff val="25000"/>
-                  </a:schemeClr>
-                </a:solidFill>
-                <a:latin typeface="Open Sans 1" panose="020B0604020202020204" charset="0"/>
-                <a:ea typeface="Open Sans 1" panose="020B0604020202020204" charset="0"/>
-                <a:cs typeface="Open Sans 1" panose="020B0604020202020204" charset="0"/>
-              </a:rPr>
-              <a:t>Grande</a:t>
-            </a:r>
-          </a:p>
-        </p:txBody>
-      </p:sp>
-      <p:sp>
-        <p:nvSpPr>
-          <p:cNvPr id="196" name="CaixaDeTexto 195"/>
-          <p:cNvSpPr txBox="1"/>
-          <p:nvPr/>
-        </p:nvSpPr>
-        <p:spPr>
-          <a:xfrm>
-            <a:off x="16131375" y="7439680"/>
-            <a:ext cx="1919054" cy="523220"/>
-          </a:xfrm>
-          <a:prstGeom prst="rect">
-            <a:avLst/>
-          </a:prstGeom>
-          <a:noFill/>
-        </p:spPr>
-        <p:txBody>
-          <a:bodyPr wrap="square" rtlCol="0">
-            <a:spAutoFit/>
-          </a:bodyPr>
-          <a:lstStyle/>
-          <a:p>
-            <a:pPr algn="ctr"/>
-            <a:r>
-              <a:rPr lang="pt-BR" sz="2800" dirty="0">
-                <a:solidFill>
-                  <a:schemeClr val="tx1">
-                    <a:lumMod val="75000"/>
-                    <a:lumOff val="25000"/>
-                  </a:schemeClr>
-                </a:solidFill>
-                <a:latin typeface="Open Sans 1" panose="020B0604020202020204" charset="0"/>
-                <a:ea typeface="Open Sans 1" panose="020B0604020202020204" charset="0"/>
-                <a:cs typeface="Open Sans 1" panose="020B0604020202020204" charset="0"/>
-              </a:rPr>
-              <a:t>Funcional</a:t>
+              <a:t>Site</a:t>
             </a:r>
           </a:p>
         </p:txBody>

</xml_diff>

<commit_message>
Slide de 'Fim' adicionado
</commit_message>
<xml_diff>
--- a/Documentação/Pyxis.pptx
+++ b/Documentação/Pyxis.pptx
@@ -5,7 +5,7 @@
     <p:sldMasterId id="2147483648" r:id="rId1"/>
   </p:sldMasterIdLst>
   <p:notesMasterIdLst>
-    <p:notesMasterId r:id="rId20"/>
+    <p:notesMasterId r:id="rId21"/>
   </p:notesMasterIdLst>
   <p:sldIdLst>
     <p:sldId id="281" r:id="rId2"/>
@@ -26,32 +26,37 @@
     <p:sldId id="265" r:id="rId17"/>
     <p:sldId id="278" r:id="rId18"/>
     <p:sldId id="279" r:id="rId19"/>
+    <p:sldId id="282" r:id="rId20"/>
   </p:sldIdLst>
   <p:sldSz cx="18288000" cy="10287000"/>
   <p:notesSz cx="6858000" cy="9144000"/>
   <p:embeddedFontLst>
     <p:embeddedFont>
+      <p:font typeface="Arial Rounded MT Bold" panose="020F0704030504030204" pitchFamily="34" charset="0"/>
+      <p:regular r:id="rId22"/>
+    </p:embeddedFont>
+    <p:embeddedFont>
       <p:font typeface="Calibri" panose="020F0502020204030204" pitchFamily="34" charset="0"/>
-      <p:regular r:id="rId21"/>
-      <p:bold r:id="rId22"/>
-      <p:italic r:id="rId23"/>
-      <p:boldItalic r:id="rId24"/>
+      <p:regular r:id="rId23"/>
+      <p:bold r:id="rId24"/>
+      <p:italic r:id="rId25"/>
+      <p:boldItalic r:id="rId26"/>
     </p:embeddedFont>
     <p:embeddedFont>
       <p:font typeface="Open Sans 1" panose="020B0604020202020204" charset="0"/>
-      <p:regular r:id="rId25"/>
+      <p:regular r:id="rId27"/>
     </p:embeddedFont>
     <p:embeddedFont>
       <p:font typeface="Open Sans 1 Bold" panose="020B0604020202020204" charset="0"/>
-      <p:regular r:id="rId26"/>
+      <p:regular r:id="rId28"/>
     </p:embeddedFont>
     <p:embeddedFont>
       <p:font typeface="Open Sans 2" panose="020B0604020202020204" charset="0"/>
-      <p:regular r:id="rId27"/>
+      <p:regular r:id="rId29"/>
     </p:embeddedFont>
     <p:embeddedFont>
       <p:font typeface="Open Sans Light" panose="020B0604020202020204" charset="0"/>
-      <p:regular r:id="rId28"/>
+      <p:regular r:id="rId30"/>
     </p:embeddedFont>
   </p:embeddedFontLst>
   <p:defaultTextStyle>
@@ -250,7 +255,7 @@
           <a:p>
             <a:fld id="{25546482-23BF-4BE9-A54E-CFB4513F4A08}" type="datetimeFigureOut">
               <a:rPr lang="pt-BR" smtClean="0"/>
-              <a:t>16/09/2020</a:t>
+              <a:t>17/09/2020</a:t>
             </a:fld>
             <a:endParaRPr lang="pt-BR"/>
           </a:p>
@@ -697,7 +702,7 @@
             <a:fld id="{1D8BD707-D9CF-40AE-B4C6-C98DA3205C09}" type="datetimeFigureOut">
               <a:rPr lang="en-US" smtClean="0"/>
               <a:pPr/>
-              <a:t>9/16/2020</a:t>
+              <a:t>9/17/2020</a:t>
             </a:fld>
             <a:endParaRPr lang="en-US"/>
           </a:p>
@@ -862,7 +867,7 @@
             <a:fld id="{1D8BD707-D9CF-40AE-B4C6-C98DA3205C09}" type="datetimeFigureOut">
               <a:rPr lang="en-US" smtClean="0"/>
               <a:pPr/>
-              <a:t>9/16/2020</a:t>
+              <a:t>9/17/2020</a:t>
             </a:fld>
             <a:endParaRPr lang="en-US"/>
           </a:p>
@@ -1037,7 +1042,7 @@
             <a:fld id="{1D8BD707-D9CF-40AE-B4C6-C98DA3205C09}" type="datetimeFigureOut">
               <a:rPr lang="en-US" smtClean="0"/>
               <a:pPr/>
-              <a:t>9/16/2020</a:t>
+              <a:t>9/17/2020</a:t>
             </a:fld>
             <a:endParaRPr lang="en-US"/>
           </a:p>
@@ -1202,7 +1207,7 @@
             <a:fld id="{1D8BD707-D9CF-40AE-B4C6-C98DA3205C09}" type="datetimeFigureOut">
               <a:rPr lang="en-US" smtClean="0"/>
               <a:pPr/>
-              <a:t>9/16/2020</a:t>
+              <a:t>9/17/2020</a:t>
             </a:fld>
             <a:endParaRPr lang="en-US"/>
           </a:p>
@@ -1444,7 +1449,7 @@
             <a:fld id="{1D8BD707-D9CF-40AE-B4C6-C98DA3205C09}" type="datetimeFigureOut">
               <a:rPr lang="en-US" smtClean="0"/>
               <a:pPr/>
-              <a:t>9/16/2020</a:t>
+              <a:t>9/17/2020</a:t>
             </a:fld>
             <a:endParaRPr lang="en-US"/>
           </a:p>
@@ -1726,7 +1731,7 @@
             <a:fld id="{1D8BD707-D9CF-40AE-B4C6-C98DA3205C09}" type="datetimeFigureOut">
               <a:rPr lang="en-US" smtClean="0"/>
               <a:pPr/>
-              <a:t>9/16/2020</a:t>
+              <a:t>9/17/2020</a:t>
             </a:fld>
             <a:endParaRPr lang="en-US"/>
           </a:p>
@@ -2142,7 +2147,7 @@
             <a:fld id="{1D8BD707-D9CF-40AE-B4C6-C98DA3205C09}" type="datetimeFigureOut">
               <a:rPr lang="en-US" smtClean="0"/>
               <a:pPr/>
-              <a:t>9/16/2020</a:t>
+              <a:t>9/17/2020</a:t>
             </a:fld>
             <a:endParaRPr lang="en-US"/>
           </a:p>
@@ -2256,7 +2261,7 @@
             <a:fld id="{1D8BD707-D9CF-40AE-B4C6-C98DA3205C09}" type="datetimeFigureOut">
               <a:rPr lang="en-US" smtClean="0"/>
               <a:pPr/>
-              <a:t>9/16/2020</a:t>
+              <a:t>9/17/2020</a:t>
             </a:fld>
             <a:endParaRPr lang="en-US"/>
           </a:p>
@@ -2348,7 +2353,7 @@
             <a:fld id="{1D8BD707-D9CF-40AE-B4C6-C98DA3205C09}" type="datetimeFigureOut">
               <a:rPr lang="en-US" smtClean="0"/>
               <a:pPr/>
-              <a:t>9/16/2020</a:t>
+              <a:t>9/17/2020</a:t>
             </a:fld>
             <a:endParaRPr lang="en-US"/>
           </a:p>
@@ -2620,7 +2625,7 @@
             <a:fld id="{1D8BD707-D9CF-40AE-B4C6-C98DA3205C09}" type="datetimeFigureOut">
               <a:rPr lang="en-US" smtClean="0"/>
               <a:pPr/>
-              <a:t>9/16/2020</a:t>
+              <a:t>9/17/2020</a:t>
             </a:fld>
             <a:endParaRPr lang="en-US"/>
           </a:p>
@@ -2869,7 +2874,7 @@
             <a:fld id="{1D8BD707-D9CF-40AE-B4C6-C98DA3205C09}" type="datetimeFigureOut">
               <a:rPr lang="en-US" smtClean="0"/>
               <a:pPr/>
-              <a:t>9/16/2020</a:t>
+              <a:t>9/17/2020</a:t>
             </a:fld>
             <a:endParaRPr lang="en-US"/>
           </a:p>
@@ -3077,7 +3082,7 @@
             <a:fld id="{1D8BD707-D9CF-40AE-B4C6-C98DA3205C09}" type="datetimeFigureOut">
               <a:rPr lang="en-US" smtClean="0"/>
               <a:pPr/>
-              <a:t>9/16/2020</a:t>
+              <a:t>9/17/2020</a:t>
             </a:fld>
             <a:endParaRPr lang="en-US"/>
           </a:p>
@@ -13533,6 +13538,179 @@
 </p:sld>
 </file>
 
+<file path=ppt/slides/slide19.xml><?xml version="1.0" encoding="utf-8"?>
+<p:sld xmlns:a="http://schemas.openxmlformats.org/drawingml/2006/main" xmlns:r="http://schemas.openxmlformats.org/officeDocument/2006/relationships" xmlns:p="http://schemas.openxmlformats.org/presentationml/2006/main">
+  <p:cSld>
+    <p:spTree>
+      <p:nvGrpSpPr>
+        <p:cNvPr id="1" name=""/>
+        <p:cNvGrpSpPr/>
+        <p:nvPr/>
+      </p:nvGrpSpPr>
+      <p:grpSpPr>
+        <a:xfrm>
+          <a:off x="0" y="0"/>
+          <a:ext cx="0" cy="0"/>
+          <a:chOff x="0" y="0"/>
+          <a:chExt cx="0" cy="0"/>
+        </a:xfrm>
+      </p:grpSpPr>
+      <p:sp>
+        <p:nvSpPr>
+          <p:cNvPr id="2" name="TextBox 2"/>
+          <p:cNvSpPr txBox="1"/>
+          <p:nvPr/>
+        </p:nvSpPr>
+        <p:spPr>
+          <a:xfrm>
+            <a:off x="3571875" y="4284290"/>
+            <a:ext cx="11144250" cy="1718419"/>
+          </a:xfrm>
+          <a:prstGeom prst="rect">
+            <a:avLst/>
+          </a:prstGeom>
+        </p:spPr>
+        <p:txBody>
+          <a:bodyPr wrap="square" lIns="0" tIns="0" rIns="0" bIns="0" rtlCol="0" anchor="t">
+            <a:spAutoFit/>
+          </a:bodyPr>
+          <a:lstStyle/>
+          <a:p>
+            <a:pPr algn="ctr">
+              <a:lnSpc>
+                <a:spcPts val="6719"/>
+              </a:lnSpc>
+            </a:pPr>
+            <a:r>
+              <a:rPr lang="en-US" sz="6600" b="1" dirty="0" err="1">
+                <a:solidFill>
+                  <a:srgbClr val="FF6864"/>
+                </a:solidFill>
+                <a:latin typeface="Arial Rounded MT Bold" panose="020F0704030504030204" pitchFamily="34" charset="0"/>
+              </a:rPr>
+              <a:t>Fim</a:t>
+            </a:r>
+            <a:r>
+              <a:rPr lang="en-US" sz="6600" b="1" dirty="0">
+                <a:solidFill>
+                  <a:srgbClr val="FF6864"/>
+                </a:solidFill>
+                <a:latin typeface="Arial Rounded MT Bold" panose="020F0704030504030204" pitchFamily="34" charset="0"/>
+              </a:rPr>
+              <a:t>!</a:t>
+            </a:r>
+          </a:p>
+          <a:p>
+            <a:pPr algn="ctr">
+              <a:lnSpc>
+                <a:spcPts val="6719"/>
+              </a:lnSpc>
+            </a:pPr>
+            <a:r>
+              <a:rPr lang="en-US" sz="6600" b="1" dirty="0" err="1">
+                <a:solidFill>
+                  <a:srgbClr val="FF6864"/>
+                </a:solidFill>
+                <a:latin typeface="Arial Rounded MT Bold" panose="020F0704030504030204" pitchFamily="34" charset="0"/>
+              </a:rPr>
+              <a:t>Obrigado</a:t>
+            </a:r>
+            <a:r>
+              <a:rPr lang="en-US" sz="6600" b="1" dirty="0">
+                <a:solidFill>
+                  <a:srgbClr val="FF6864"/>
+                </a:solidFill>
+                <a:latin typeface="Arial Rounded MT Bold" panose="020F0704030504030204" pitchFamily="34" charset="0"/>
+              </a:rPr>
+              <a:t> pela </a:t>
+            </a:r>
+            <a:r>
+              <a:rPr lang="en-US" sz="6600" b="1" dirty="0" err="1">
+                <a:solidFill>
+                  <a:srgbClr val="FF6864"/>
+                </a:solidFill>
+                <a:latin typeface="Arial Rounded MT Bold" panose="020F0704030504030204" pitchFamily="34" charset="0"/>
+              </a:rPr>
+              <a:t>atenção</a:t>
+            </a:r>
+            <a:r>
+              <a:rPr lang="en-US" sz="6600" b="1" dirty="0">
+                <a:solidFill>
+                  <a:srgbClr val="FF6864"/>
+                </a:solidFill>
+                <a:latin typeface="Arial Rounded MT Bold" panose="020F0704030504030204" pitchFamily="34" charset="0"/>
+              </a:rPr>
+              <a:t> :</a:t>
+            </a:r>
+            <a:r>
+              <a:rPr lang="en-US" sz="6600" b="1" dirty="0">
+                <a:solidFill>
+                  <a:srgbClr val="FF6864"/>
+                </a:solidFill>
+                <a:latin typeface="Arial Rounded MT Bold" panose="020F0704030504030204" pitchFamily="34" charset="0"/>
+                <a:sym typeface="Wingdings" panose="05000000000000000000" pitchFamily="2" charset="2"/>
+              </a:rPr>
+              <a:t>)</a:t>
+            </a:r>
+            <a:endParaRPr lang="en-US" sz="6600" b="1" dirty="0">
+              <a:solidFill>
+                <a:srgbClr val="FF6864"/>
+              </a:solidFill>
+              <a:latin typeface="Arial Rounded MT Bold" panose="020F0704030504030204" pitchFamily="34" charset="0"/>
+            </a:endParaRPr>
+          </a:p>
+        </p:txBody>
+      </p:sp>
+      <p:pic>
+        <p:nvPicPr>
+          <p:cNvPr id="8" name="Picture 7"/>
+          <p:cNvPicPr>
+            <a:picLocks noChangeAspect="1"/>
+          </p:cNvPicPr>
+          <p:nvPr/>
+        </p:nvPicPr>
+        <p:blipFill>
+          <a:blip r:embed="rId2"/>
+          <a:srcRect/>
+          <a:stretch>
+            <a:fillRect/>
+          </a:stretch>
+        </p:blipFill>
+        <p:spPr>
+          <a:xfrm>
+            <a:off x="17078325" y="341670"/>
+            <a:ext cx="915994" cy="1028732"/>
+          </a:xfrm>
+          <a:prstGeom prst="rect">
+            <a:avLst/>
+          </a:prstGeom>
+        </p:spPr>
+      </p:pic>
+    </p:spTree>
+    <p:extLst>
+      <p:ext uri="{BB962C8B-B14F-4D97-AF65-F5344CB8AC3E}">
+        <p14:creationId xmlns:p14="http://schemas.microsoft.com/office/powerpoint/2010/main" val="2678339526"/>
+      </p:ext>
+    </p:extLst>
+  </p:cSld>
+  <p:clrMapOvr>
+    <a:masterClrMapping/>
+  </p:clrMapOvr>
+  <mc:AlternateContent xmlns:mc="http://schemas.openxmlformats.org/markup-compatibility/2006" xmlns:p14="http://schemas.microsoft.com/office/powerpoint/2010/main">
+    <mc:Choice Requires="p14">
+      <p:transition spd="med" p14:dur="700">
+        <p:fade/>
+      </p:transition>
+    </mc:Choice>
+    <mc:Fallback xmlns="">
+      <p:transition spd="med">
+        <p:fade/>
+      </p:transition>
+    </mc:Fallback>
+  </mc:AlternateContent>
+</p:sld>
+</file>
+
 <file path=ppt/slides/slide2.xml><?xml version="1.0" encoding="utf-8"?>
 <p:sld xmlns:a="http://schemas.openxmlformats.org/drawingml/2006/main" xmlns:r="http://schemas.openxmlformats.org/officeDocument/2006/relationships" xmlns:p="http://schemas.openxmlformats.org/presentationml/2006/main">
   <p:cSld>

</xml_diff>

<commit_message>
Att mockup e slides
</commit_message>
<xml_diff>
--- a/Documentação/Pyxis.pptx
+++ b/Documentação/Pyxis.pptx
@@ -279,7 +279,7 @@
           <a:p>
             <a:fld id="{390E6ACA-D9D5-454D-960A-10CA55DA44EF}" type="datetimeFigureOut">
               <a:rPr lang="pt-BR" smtClean="0"/>
-              <a:t>23/10/2020</a:t>
+              <a:t>26/10/2020</a:t>
             </a:fld>
             <a:endParaRPr lang="pt-BR"/>
           </a:p>
@@ -477,7 +477,7 @@
           <a:p>
             <a:fld id="{390E6ACA-D9D5-454D-960A-10CA55DA44EF}" type="datetimeFigureOut">
               <a:rPr lang="pt-BR" smtClean="0"/>
-              <a:t>23/10/2020</a:t>
+              <a:t>26/10/2020</a:t>
             </a:fld>
             <a:endParaRPr lang="pt-BR"/>
           </a:p>
@@ -685,7 +685,7 @@
           <a:p>
             <a:fld id="{390E6ACA-D9D5-454D-960A-10CA55DA44EF}" type="datetimeFigureOut">
               <a:rPr lang="pt-BR" smtClean="0"/>
-              <a:t>23/10/2020</a:t>
+              <a:t>26/10/2020</a:t>
             </a:fld>
             <a:endParaRPr lang="pt-BR"/>
           </a:p>
@@ -883,7 +883,7 @@
           <a:p>
             <a:fld id="{390E6ACA-D9D5-454D-960A-10CA55DA44EF}" type="datetimeFigureOut">
               <a:rPr lang="pt-BR" smtClean="0"/>
-              <a:t>23/10/2020</a:t>
+              <a:t>26/10/2020</a:t>
             </a:fld>
             <a:endParaRPr lang="pt-BR"/>
           </a:p>
@@ -1158,7 +1158,7 @@
           <a:p>
             <a:fld id="{390E6ACA-D9D5-454D-960A-10CA55DA44EF}" type="datetimeFigureOut">
               <a:rPr lang="pt-BR" smtClean="0"/>
-              <a:t>23/10/2020</a:t>
+              <a:t>26/10/2020</a:t>
             </a:fld>
             <a:endParaRPr lang="pt-BR"/>
           </a:p>
@@ -1423,7 +1423,7 @@
           <a:p>
             <a:fld id="{390E6ACA-D9D5-454D-960A-10CA55DA44EF}" type="datetimeFigureOut">
               <a:rPr lang="pt-BR" smtClean="0"/>
-              <a:t>23/10/2020</a:t>
+              <a:t>26/10/2020</a:t>
             </a:fld>
             <a:endParaRPr lang="pt-BR"/>
           </a:p>
@@ -1835,7 +1835,7 @@
           <a:p>
             <a:fld id="{390E6ACA-D9D5-454D-960A-10CA55DA44EF}" type="datetimeFigureOut">
               <a:rPr lang="pt-BR" smtClean="0"/>
-              <a:t>23/10/2020</a:t>
+              <a:t>26/10/2020</a:t>
             </a:fld>
             <a:endParaRPr lang="pt-BR"/>
           </a:p>
@@ -1976,7 +1976,7 @@
           <a:p>
             <a:fld id="{390E6ACA-D9D5-454D-960A-10CA55DA44EF}" type="datetimeFigureOut">
               <a:rPr lang="pt-BR" smtClean="0"/>
-              <a:t>23/10/2020</a:t>
+              <a:t>26/10/2020</a:t>
             </a:fld>
             <a:endParaRPr lang="pt-BR"/>
           </a:p>
@@ -2089,7 +2089,7 @@
           <a:p>
             <a:fld id="{390E6ACA-D9D5-454D-960A-10CA55DA44EF}" type="datetimeFigureOut">
               <a:rPr lang="pt-BR" smtClean="0"/>
-              <a:t>23/10/2020</a:t>
+              <a:t>26/10/2020</a:t>
             </a:fld>
             <a:endParaRPr lang="pt-BR"/>
           </a:p>
@@ -2400,7 +2400,7 @@
           <a:p>
             <a:fld id="{390E6ACA-D9D5-454D-960A-10CA55DA44EF}" type="datetimeFigureOut">
               <a:rPr lang="pt-BR" smtClean="0"/>
-              <a:t>23/10/2020</a:t>
+              <a:t>26/10/2020</a:t>
             </a:fld>
             <a:endParaRPr lang="pt-BR"/>
           </a:p>
@@ -2688,7 +2688,7 @@
           <a:p>
             <a:fld id="{390E6ACA-D9D5-454D-960A-10CA55DA44EF}" type="datetimeFigureOut">
               <a:rPr lang="pt-BR" smtClean="0"/>
-              <a:t>23/10/2020</a:t>
+              <a:t>26/10/2020</a:t>
             </a:fld>
             <a:endParaRPr lang="pt-BR"/>
           </a:p>
@@ -2929,7 +2929,7 @@
           <a:p>
             <a:fld id="{390E6ACA-D9D5-454D-960A-10CA55DA44EF}" type="datetimeFigureOut">
               <a:rPr lang="pt-BR" smtClean="0"/>
-              <a:t>23/10/2020</a:t>
+              <a:t>26/10/2020</a:t>
             </a:fld>
             <a:endParaRPr lang="pt-BR"/>
           </a:p>
@@ -4577,12 +4577,15 @@
               </a:rPr>
               <a:t>Mockup</a:t>
             </a:r>
-            <a:endParaRPr lang="pt-BR" sz="6000" b="1" dirty="0">
-              <a:solidFill>
-                <a:srgbClr val="545454"/>
-              </a:solidFill>
-              <a:latin typeface="Open Sans 1 Bold"/>
-            </a:endParaRPr>
+            <a:r>
+              <a:rPr lang="pt-BR" sz="6000" b="1" dirty="0">
+                <a:solidFill>
+                  <a:srgbClr val="545454"/>
+                </a:solidFill>
+                <a:latin typeface="Open Sans 1 Bold"/>
+              </a:rPr>
+              <a:t> de Tela</a:t>
+            </a:r>
           </a:p>
         </p:txBody>
       </p:sp>
@@ -4660,10 +4663,10 @@
       </p:grpSpPr>
       <p:pic>
         <p:nvPicPr>
-          <p:cNvPr id="4" name="Imagem 3" descr="Interface gráfica do usuário, Aplicativo&#10;&#10;Descrição gerada automaticamente">
-            <a:extLst>
-              <a:ext uri="{FF2B5EF4-FFF2-40B4-BE49-F238E27FC236}">
-                <a16:creationId xmlns:a16="http://schemas.microsoft.com/office/drawing/2014/main" id="{B4459D67-89D7-404C-8BE0-D3029E246B41}"/>
+          <p:cNvPr id="6" name="Imagem 5" descr="Interface gráfica do usuário, Aplicativo&#10;&#10;Descrição gerada automaticamente">
+            <a:extLst>
+              <a:ext uri="{FF2B5EF4-FFF2-40B4-BE49-F238E27FC236}">
+                <a16:creationId xmlns:a16="http://schemas.microsoft.com/office/drawing/2014/main" id="{8A4E3681-0049-4828-A006-D0E8B562940A}"/>
               </a:ext>
             </a:extLst>
           </p:cNvPr>
@@ -4672,7 +4675,7 @@
           </p:cNvPicPr>
           <p:nvPr/>
         </p:nvPicPr>
-        <p:blipFill>
+        <p:blipFill rotWithShape="1">
           <a:blip r:embed="rId2">
             <a:extLst>
               <a:ext uri="{28A0092B-C50C-407E-A947-70E740481C1C}">
@@ -4680,14 +4683,48 @@
               </a:ext>
             </a:extLst>
           </a:blip>
-          <a:stretch>
-            <a:fillRect/>
-          </a:stretch>
+          <a:srcRect l="1330" t="3214" r="1178" b="1450"/>
+          <a:stretch/>
         </p:blipFill>
         <p:spPr>
           <a:xfrm>
-            <a:off x="1691139" y="335865"/>
-            <a:ext cx="8809722" cy="6186270"/>
+            <a:off x="507225" y="317241"/>
+            <a:ext cx="4422710" cy="4539316"/>
+          </a:xfrm>
+          <a:prstGeom prst="rect">
+            <a:avLst/>
+          </a:prstGeom>
+        </p:spPr>
+      </p:pic>
+      <p:pic>
+        <p:nvPicPr>
+          <p:cNvPr id="8" name="Imagem 7" descr="Interface gráfica do usuário, Aplicativo&#10;&#10;Descrição gerada automaticamente">
+            <a:extLst>
+              <a:ext uri="{FF2B5EF4-FFF2-40B4-BE49-F238E27FC236}">
+                <a16:creationId xmlns:a16="http://schemas.microsoft.com/office/drawing/2014/main" id="{D5BC74BC-7CF2-441E-BBAB-45BB587DEE8D}"/>
+              </a:ext>
+            </a:extLst>
+          </p:cNvPr>
+          <p:cNvPicPr>
+            <a:picLocks noChangeAspect="1"/>
+          </p:cNvPicPr>
+          <p:nvPr/>
+        </p:nvPicPr>
+        <p:blipFill rotWithShape="1">
+          <a:blip r:embed="rId3">
+            <a:extLst>
+              <a:ext uri="{28A0092B-C50C-407E-A947-70E740481C1C}">
+                <a14:useLocalDpi xmlns:a14="http://schemas.microsoft.com/office/drawing/2010/main" val="0"/>
+              </a:ext>
+            </a:extLst>
+          </a:blip>
+          <a:srcRect l="1112" t="2858" r="1494" b="25169"/>
+          <a:stretch/>
+        </p:blipFill>
+        <p:spPr>
+          <a:xfrm>
+            <a:off x="5321296" y="1651517"/>
+            <a:ext cx="6363479" cy="4935895"/>
           </a:xfrm>
           <a:prstGeom prst="rect">
             <a:avLst/>
@@ -4738,10 +4775,10 @@
       </p:grpSpPr>
       <p:pic>
         <p:nvPicPr>
-          <p:cNvPr id="3" name="Imagem 2" descr="Uma imagem contendo Tabela&#10;&#10;Descrição gerada automaticamente">
-            <a:extLst>
-              <a:ext uri="{FF2B5EF4-FFF2-40B4-BE49-F238E27FC236}">
-                <a16:creationId xmlns:a16="http://schemas.microsoft.com/office/drawing/2014/main" id="{78A34BAF-5F4F-466C-BFCE-ABBAF1BF46AE}"/>
+          <p:cNvPr id="4" name="Imagem 3" descr="Interface gráfica do usuário, Aplicativo, Teams&#10;&#10;Descrição gerada automaticamente">
+            <a:extLst>
+              <a:ext uri="{FF2B5EF4-FFF2-40B4-BE49-F238E27FC236}">
+                <a16:creationId xmlns:a16="http://schemas.microsoft.com/office/drawing/2014/main" id="{3CAB35DF-E57E-4D4E-B63C-2F5F359EF789}"/>
               </a:ext>
             </a:extLst>
           </p:cNvPr>
@@ -4750,7 +4787,7 @@
           </p:cNvPicPr>
           <p:nvPr/>
         </p:nvPicPr>
-        <p:blipFill>
+        <p:blipFill rotWithShape="1">
           <a:blip r:embed="rId2">
             <a:extLst>
               <a:ext uri="{28A0092B-C50C-407E-A947-70E740481C1C}">
@@ -4758,14 +4795,48 @@
               </a:ext>
             </a:extLst>
           </a:blip>
-          <a:stretch>
-            <a:fillRect/>
-          </a:stretch>
+          <a:srcRect l="2164" t="5448" r="2462" b="2222"/>
+          <a:stretch/>
         </p:blipFill>
         <p:spPr>
           <a:xfrm>
-            <a:off x="1691400" y="462982"/>
-            <a:ext cx="8809200" cy="5932036"/>
+            <a:off x="570270" y="482050"/>
+            <a:ext cx="5101401" cy="5149375"/>
+          </a:xfrm>
+          <a:prstGeom prst="rect">
+            <a:avLst/>
+          </a:prstGeom>
+        </p:spPr>
+      </p:pic>
+      <p:pic>
+        <p:nvPicPr>
+          <p:cNvPr id="6" name="Imagem 5" descr="Interface gráfica do usuário, Aplicativo&#10;&#10;Descrição gerada automaticamente">
+            <a:extLst>
+              <a:ext uri="{FF2B5EF4-FFF2-40B4-BE49-F238E27FC236}">
+                <a16:creationId xmlns:a16="http://schemas.microsoft.com/office/drawing/2014/main" id="{51E0656A-CCCB-410B-8062-33FF21F7EABE}"/>
+              </a:ext>
+            </a:extLst>
+          </p:cNvPr>
+          <p:cNvPicPr>
+            <a:picLocks noChangeAspect="1"/>
+          </p:cNvPicPr>
+          <p:nvPr/>
+        </p:nvPicPr>
+        <p:blipFill rotWithShape="1">
+          <a:blip r:embed="rId3">
+            <a:extLst>
+              <a:ext uri="{28A0092B-C50C-407E-A947-70E740481C1C}">
+                <a14:useLocalDpi xmlns:a14="http://schemas.microsoft.com/office/drawing/2010/main" val="0"/>
+              </a:ext>
+            </a:extLst>
+          </a:blip>
+          <a:srcRect l="2440" t="4587" r="1729" b="3262"/>
+          <a:stretch/>
+        </p:blipFill>
+        <p:spPr>
+          <a:xfrm>
+            <a:off x="6813756" y="482050"/>
+            <a:ext cx="4326195" cy="5149375"/>
           </a:xfrm>
           <a:prstGeom prst="rect">
             <a:avLst/>
@@ -4782,13 +4853,13 @@
   <p:clrMapOvr>
     <a:masterClrMapping/>
   </p:clrMapOvr>
-  <mc:AlternateContent xmlns:mc="http://schemas.openxmlformats.org/markup-compatibility/2006">
-    <mc:Choice xmlns:p14="http://schemas.microsoft.com/office/powerpoint/2010/main" Requires="p14">
+  <mc:AlternateContent xmlns:mc="http://schemas.openxmlformats.org/markup-compatibility/2006" xmlns:p14="http://schemas.microsoft.com/office/powerpoint/2010/main">
+    <mc:Choice Requires="p14">
       <p:transition spd="med" p14:dur="700">
         <p:fade/>
       </p:transition>
     </mc:Choice>
-    <mc:Fallback>
+    <mc:Fallback xmlns="">
       <p:transition spd="med">
         <p:fade/>
       </p:transition>

</xml_diff>